<commit_message>
Update pptx-file so shapes scale better
Set property Size/Lock-aspect-ratio to true for of all shapes to scale better
</commit_message>
<xml_diff>
--- a/Archimate powerpoint.pptx
+++ b/Archimate powerpoint.pptx
@@ -110,7 +110,1084 @@
       </a:defRPr>
     </a:lvl9pPr>
   </p:defaultTextStyle>
+  <p:extLst>
+    <p:ext uri="{EFAFB233-063F-42B5-8137-9DF3F51BA10A}">
+      <p15:sldGuideLst xmlns:p15="http://schemas.microsoft.com/office/powerpoint/2012/main"/>
+    </p:ext>
+  </p:extLst>
 </p:presentation>
+</file>
+
+<file path=ppt/changesInfos/changesInfo1.xml><?xml version="1.0" encoding="utf-8"?>
+<pc:chgInfo xmlns:a="http://schemas.openxmlformats.org/drawingml/2006/main" xmlns:r="http://schemas.openxmlformats.org/officeDocument/2006/relationships" xmlns:ac="http://schemas.microsoft.com/office/drawing/2013/main/command" xmlns:pc="http://schemas.microsoft.com/office/powerpoint/2013/main/command">
+  <pc:docChgLst>
+    <pc:chgData name="Ad Gerrits" userId="dea84a69e24d5d19" providerId="LiveId" clId="{F37CBAFA-4AA0-463F-B6CC-2800004C0261}"/>
+    <pc:docChg chg="undo custSel modSld">
+      <pc:chgData name="Ad Gerrits" userId="dea84a69e24d5d19" providerId="LiveId" clId="{F37CBAFA-4AA0-463F-B6CC-2800004C0261}" dt="2022-11-06T13:41:50.801" v="50"/>
+      <pc:docMkLst>
+        <pc:docMk/>
+      </pc:docMkLst>
+      <pc:sldChg chg="addSp delSp modSp mod">
+        <pc:chgData name="Ad Gerrits" userId="dea84a69e24d5d19" providerId="LiveId" clId="{F37CBAFA-4AA0-463F-B6CC-2800004C0261}" dt="2022-11-06T13:39:11.261" v="39" actId="14100"/>
+        <pc:sldMkLst>
+          <pc:docMk/>
+          <pc:sldMk cId="1567708105" sldId="257"/>
+        </pc:sldMkLst>
+        <pc:spChg chg="mod">
+          <ac:chgData name="Ad Gerrits" userId="dea84a69e24d5d19" providerId="LiveId" clId="{F37CBAFA-4AA0-463F-B6CC-2800004C0261}" dt="2022-11-06T13:39:01.198" v="38"/>
+          <ac:spMkLst>
+            <pc:docMk/>
+            <pc:sldMk cId="1567708105" sldId="257"/>
+            <ac:spMk id="4" creationId="{83D0B8A5-D648-4D2C-A7CB-246EDF05C423}"/>
+          </ac:spMkLst>
+        </pc:spChg>
+        <pc:spChg chg="mod">
+          <ac:chgData name="Ad Gerrits" userId="dea84a69e24d5d19" providerId="LiveId" clId="{F37CBAFA-4AA0-463F-B6CC-2800004C0261}" dt="2022-11-06T13:39:01.198" v="38"/>
+          <ac:spMkLst>
+            <pc:docMk/>
+            <pc:sldMk cId="1567708105" sldId="257"/>
+            <ac:spMk id="8" creationId="{263F12E9-6F52-4102-9458-8D51D6B06332}"/>
+          </ac:spMkLst>
+        </pc:spChg>
+        <pc:spChg chg="mod">
+          <ac:chgData name="Ad Gerrits" userId="dea84a69e24d5d19" providerId="LiveId" clId="{F37CBAFA-4AA0-463F-B6CC-2800004C0261}" dt="2022-11-06T13:39:01.198" v="38"/>
+          <ac:spMkLst>
+            <pc:docMk/>
+            <pc:sldMk cId="1567708105" sldId="257"/>
+            <ac:spMk id="9" creationId="{85FD028E-A586-47CE-A8EE-6A491696EA16}"/>
+          </ac:spMkLst>
+        </pc:spChg>
+        <pc:spChg chg="mod">
+          <ac:chgData name="Ad Gerrits" userId="dea84a69e24d5d19" providerId="LiveId" clId="{F37CBAFA-4AA0-463F-B6CC-2800004C0261}" dt="2022-11-06T13:39:01.198" v="38"/>
+          <ac:spMkLst>
+            <pc:docMk/>
+            <pc:sldMk cId="1567708105" sldId="257"/>
+            <ac:spMk id="10" creationId="{DD9D82B9-5AC9-4DA1-AB01-ABE2304144F8}"/>
+          </ac:spMkLst>
+        </pc:spChg>
+        <pc:spChg chg="mod">
+          <ac:chgData name="Ad Gerrits" userId="dea84a69e24d5d19" providerId="LiveId" clId="{F37CBAFA-4AA0-463F-B6CC-2800004C0261}" dt="2022-11-06T13:39:01.198" v="38"/>
+          <ac:spMkLst>
+            <pc:docMk/>
+            <pc:sldMk cId="1567708105" sldId="257"/>
+            <ac:spMk id="158" creationId="{4C000D5B-9C08-422D-A0D3-102475117A25}"/>
+          </ac:spMkLst>
+        </pc:spChg>
+        <pc:spChg chg="mod">
+          <ac:chgData name="Ad Gerrits" userId="dea84a69e24d5d19" providerId="LiveId" clId="{F37CBAFA-4AA0-463F-B6CC-2800004C0261}" dt="2022-11-06T13:36:17.889" v="30" actId="27636"/>
+          <ac:spMkLst>
+            <pc:docMk/>
+            <pc:sldMk cId="1567708105" sldId="257"/>
+            <ac:spMk id="198" creationId="{9C0FBF60-CC5D-69D4-3192-BE122E5C735D}"/>
+          </ac:spMkLst>
+        </pc:spChg>
+        <pc:spChg chg="mod">
+          <ac:chgData name="Ad Gerrits" userId="dea84a69e24d5d19" providerId="LiveId" clId="{F37CBAFA-4AA0-463F-B6CC-2800004C0261}" dt="2022-11-06T13:36:17.889" v="28" actId="27636"/>
+          <ac:spMkLst>
+            <pc:docMk/>
+            <pc:sldMk cId="1567708105" sldId="257"/>
+            <ac:spMk id="199" creationId="{131B87FD-3A91-6CEC-8900-5FC62013B54A}"/>
+          </ac:spMkLst>
+        </pc:spChg>
+        <pc:spChg chg="mod">
+          <ac:chgData name="Ad Gerrits" userId="dea84a69e24d5d19" providerId="LiveId" clId="{F37CBAFA-4AA0-463F-B6CC-2800004C0261}" dt="2022-11-06T13:36:17.889" v="33" actId="27636"/>
+          <ac:spMkLst>
+            <pc:docMk/>
+            <pc:sldMk cId="1567708105" sldId="257"/>
+            <ac:spMk id="200" creationId="{32F7F0D9-B228-53F1-6C12-C94198C52741}"/>
+          </ac:spMkLst>
+        </pc:spChg>
+        <pc:spChg chg="mod">
+          <ac:chgData name="Ad Gerrits" userId="dea84a69e24d5d19" providerId="LiveId" clId="{F37CBAFA-4AA0-463F-B6CC-2800004C0261}" dt="2022-11-06T13:36:17.889" v="29" actId="27636"/>
+          <ac:spMkLst>
+            <pc:docMk/>
+            <pc:sldMk cId="1567708105" sldId="257"/>
+            <ac:spMk id="202" creationId="{08A10CED-7384-115E-93E0-9AC9E5533EE7}"/>
+          </ac:spMkLst>
+        </pc:spChg>
+        <pc:spChg chg="mod">
+          <ac:chgData name="Ad Gerrits" userId="dea84a69e24d5d19" providerId="LiveId" clId="{F37CBAFA-4AA0-463F-B6CC-2800004C0261}" dt="2022-11-06T13:36:17.889" v="34" actId="27636"/>
+          <ac:spMkLst>
+            <pc:docMk/>
+            <pc:sldMk cId="1567708105" sldId="257"/>
+            <ac:spMk id="203" creationId="{2AE5D762-5C03-396E-47DE-5C5DBB07FE0D}"/>
+          </ac:spMkLst>
+        </pc:spChg>
+        <pc:spChg chg="mod">
+          <ac:chgData name="Ad Gerrits" userId="dea84a69e24d5d19" providerId="LiveId" clId="{F37CBAFA-4AA0-463F-B6CC-2800004C0261}" dt="2022-11-06T13:36:17.889" v="32" actId="27636"/>
+          <ac:spMkLst>
+            <pc:docMk/>
+            <pc:sldMk cId="1567708105" sldId="257"/>
+            <ac:spMk id="205" creationId="{6086C18B-6196-AC2F-5C7B-776FF0B296FB}"/>
+          </ac:spMkLst>
+        </pc:spChg>
+        <pc:spChg chg="mod">
+          <ac:chgData name="Ad Gerrits" userId="dea84a69e24d5d19" providerId="LiveId" clId="{F37CBAFA-4AA0-463F-B6CC-2800004C0261}" dt="2022-11-06T13:36:17.889" v="31" actId="27636"/>
+          <ac:spMkLst>
+            <pc:docMk/>
+            <pc:sldMk cId="1567708105" sldId="257"/>
+            <ac:spMk id="206" creationId="{FCFFE952-231E-D665-ED68-28CFFCAAF467}"/>
+          </ac:spMkLst>
+        </pc:spChg>
+        <pc:spChg chg="mod">
+          <ac:chgData name="Ad Gerrits" userId="dea84a69e24d5d19" providerId="LiveId" clId="{F37CBAFA-4AA0-463F-B6CC-2800004C0261}" dt="2022-11-06T13:36:17.873" v="27" actId="3064"/>
+          <ac:spMkLst>
+            <pc:docMk/>
+            <pc:sldMk cId="1567708105" sldId="257"/>
+            <ac:spMk id="212" creationId="{DDC440CE-3C6E-2C7E-4BA2-6288386BA7C6}"/>
+          </ac:spMkLst>
+        </pc:spChg>
+        <pc:grpChg chg="add del mod">
+          <ac:chgData name="Ad Gerrits" userId="dea84a69e24d5d19" providerId="LiveId" clId="{F37CBAFA-4AA0-463F-B6CC-2800004C0261}" dt="2022-11-06T13:38:50.773" v="37" actId="478"/>
+          <ac:grpSpMkLst>
+            <pc:docMk/>
+            <pc:sldMk cId="1567708105" sldId="257"/>
+            <ac:grpSpMk id="3" creationId="{7FE20A22-896E-DF40-D225-659ED2B38D86}"/>
+          </ac:grpSpMkLst>
+        </pc:grpChg>
+        <pc:grpChg chg="mod">
+          <ac:chgData name="Ad Gerrits" userId="dea84a69e24d5d19" providerId="LiveId" clId="{F37CBAFA-4AA0-463F-B6CC-2800004C0261}" dt="2022-11-06T13:39:01.198" v="38"/>
+          <ac:grpSpMkLst>
+            <pc:docMk/>
+            <pc:sldMk cId="1567708105" sldId="257"/>
+            <ac:grpSpMk id="5" creationId="{CE106719-F59C-4FC8-8A4E-E53C1AC78076}"/>
+          </ac:grpSpMkLst>
+        </pc:grpChg>
+        <pc:grpChg chg="mod">
+          <ac:chgData name="Ad Gerrits" userId="dea84a69e24d5d19" providerId="LiveId" clId="{F37CBAFA-4AA0-463F-B6CC-2800004C0261}" dt="2022-11-06T13:39:01.198" v="38"/>
+          <ac:grpSpMkLst>
+            <pc:docMk/>
+            <pc:sldMk cId="1567708105" sldId="257"/>
+            <ac:grpSpMk id="11" creationId="{2683692D-2C4C-429F-90BC-843048DD9F90}"/>
+          </ac:grpSpMkLst>
+        </pc:grpChg>
+        <pc:grpChg chg="mod">
+          <ac:chgData name="Ad Gerrits" userId="dea84a69e24d5d19" providerId="LiveId" clId="{F37CBAFA-4AA0-463F-B6CC-2800004C0261}" dt="2022-11-06T13:39:01.198" v="38"/>
+          <ac:grpSpMkLst>
+            <pc:docMk/>
+            <pc:sldMk cId="1567708105" sldId="257"/>
+            <ac:grpSpMk id="27" creationId="{587FBFB8-A61C-4D14-9511-1165EB849751}"/>
+          </ac:grpSpMkLst>
+        </pc:grpChg>
+        <pc:grpChg chg="mod">
+          <ac:chgData name="Ad Gerrits" userId="dea84a69e24d5d19" providerId="LiveId" clId="{F37CBAFA-4AA0-463F-B6CC-2800004C0261}" dt="2022-11-06T13:39:01.198" v="38"/>
+          <ac:grpSpMkLst>
+            <pc:docMk/>
+            <pc:sldMk cId="1567708105" sldId="257"/>
+            <ac:grpSpMk id="41" creationId="{885FD846-BBC4-438C-B4BF-5F4CCDFF5277}"/>
+          </ac:grpSpMkLst>
+        </pc:grpChg>
+        <pc:grpChg chg="mod">
+          <ac:chgData name="Ad Gerrits" userId="dea84a69e24d5d19" providerId="LiveId" clId="{F37CBAFA-4AA0-463F-B6CC-2800004C0261}" dt="2022-11-06T13:39:01.198" v="38"/>
+          <ac:grpSpMkLst>
+            <pc:docMk/>
+            <pc:sldMk cId="1567708105" sldId="257"/>
+            <ac:grpSpMk id="53" creationId="{6434EBE3-654F-4545-824A-9C9A4B55EECA}"/>
+          </ac:grpSpMkLst>
+        </pc:grpChg>
+        <pc:grpChg chg="mod">
+          <ac:chgData name="Ad Gerrits" userId="dea84a69e24d5d19" providerId="LiveId" clId="{F37CBAFA-4AA0-463F-B6CC-2800004C0261}" dt="2022-11-06T13:39:01.198" v="38"/>
+          <ac:grpSpMkLst>
+            <pc:docMk/>
+            <pc:sldMk cId="1567708105" sldId="257"/>
+            <ac:grpSpMk id="80" creationId="{3A791BFE-E93D-430B-B49D-CDA67686678C}"/>
+          </ac:grpSpMkLst>
+        </pc:grpChg>
+        <pc:grpChg chg="mod">
+          <ac:chgData name="Ad Gerrits" userId="dea84a69e24d5d19" providerId="LiveId" clId="{F37CBAFA-4AA0-463F-B6CC-2800004C0261}" dt="2022-11-06T13:39:01.198" v="38"/>
+          <ac:grpSpMkLst>
+            <pc:docMk/>
+            <pc:sldMk cId="1567708105" sldId="257"/>
+            <ac:grpSpMk id="84" creationId="{D77F3993-D35E-4D4E-AC27-18F7DF0ADB6D}"/>
+          </ac:grpSpMkLst>
+        </pc:grpChg>
+        <pc:grpChg chg="mod">
+          <ac:chgData name="Ad Gerrits" userId="dea84a69e24d5d19" providerId="LiveId" clId="{F37CBAFA-4AA0-463F-B6CC-2800004C0261}" dt="2022-11-06T13:39:01.198" v="38"/>
+          <ac:grpSpMkLst>
+            <pc:docMk/>
+            <pc:sldMk cId="1567708105" sldId="257"/>
+            <ac:grpSpMk id="103" creationId="{077A0A48-B67A-434E-B12E-681C79BF9D48}"/>
+          </ac:grpSpMkLst>
+        </pc:grpChg>
+        <pc:grpChg chg="mod">
+          <ac:chgData name="Ad Gerrits" userId="dea84a69e24d5d19" providerId="LiveId" clId="{F37CBAFA-4AA0-463F-B6CC-2800004C0261}" dt="2022-11-06T13:39:01.198" v="38"/>
+          <ac:grpSpMkLst>
+            <pc:docMk/>
+            <pc:sldMk cId="1567708105" sldId="257"/>
+            <ac:grpSpMk id="121" creationId="{895F9E8F-B888-4397-84D1-8C0DE6175016}"/>
+          </ac:grpSpMkLst>
+        </pc:grpChg>
+        <pc:grpChg chg="mod">
+          <ac:chgData name="Ad Gerrits" userId="dea84a69e24d5d19" providerId="LiveId" clId="{F37CBAFA-4AA0-463F-B6CC-2800004C0261}" dt="2022-11-06T13:39:11.261" v="39" actId="14100"/>
+          <ac:grpSpMkLst>
+            <pc:docMk/>
+            <pc:sldMk cId="1567708105" sldId="257"/>
+            <ac:grpSpMk id="124" creationId="{4248828B-0B9C-4827-B003-C11D17451298}"/>
+          </ac:grpSpMkLst>
+        </pc:grpChg>
+        <pc:grpChg chg="mod">
+          <ac:chgData name="Ad Gerrits" userId="dea84a69e24d5d19" providerId="LiveId" clId="{F37CBAFA-4AA0-463F-B6CC-2800004C0261}" dt="2022-11-06T13:39:01.198" v="38"/>
+          <ac:grpSpMkLst>
+            <pc:docMk/>
+            <pc:sldMk cId="1567708105" sldId="257"/>
+            <ac:grpSpMk id="140" creationId="{F6A0A743-884A-4D1C-80E4-111CAF9A51C9}"/>
+          </ac:grpSpMkLst>
+        </pc:grpChg>
+        <pc:grpChg chg="mod">
+          <ac:chgData name="Ad Gerrits" userId="dea84a69e24d5d19" providerId="LiveId" clId="{F37CBAFA-4AA0-463F-B6CC-2800004C0261}" dt="2022-11-06T13:39:01.198" v="38"/>
+          <ac:grpSpMkLst>
+            <pc:docMk/>
+            <pc:sldMk cId="1567708105" sldId="257"/>
+            <ac:grpSpMk id="159" creationId="{DECAE405-1EFC-40C1-B1E9-AC9EDF0A27B7}"/>
+          </ac:grpSpMkLst>
+        </pc:grpChg>
+        <pc:grpChg chg="mod">
+          <ac:chgData name="Ad Gerrits" userId="dea84a69e24d5d19" providerId="LiveId" clId="{F37CBAFA-4AA0-463F-B6CC-2800004C0261}" dt="2022-11-06T13:39:01.198" v="38"/>
+          <ac:grpSpMkLst>
+            <pc:docMk/>
+            <pc:sldMk cId="1567708105" sldId="257"/>
+            <ac:grpSpMk id="175" creationId="{EB9E3898-EE48-4326-88EF-8122C1F0320B}"/>
+          </ac:grpSpMkLst>
+        </pc:grpChg>
+        <pc:grpChg chg="mod">
+          <ac:chgData name="Ad Gerrits" userId="dea84a69e24d5d19" providerId="LiveId" clId="{F37CBAFA-4AA0-463F-B6CC-2800004C0261}" dt="2022-11-06T13:39:01.198" v="38"/>
+          <ac:grpSpMkLst>
+            <pc:docMk/>
+            <pc:sldMk cId="1567708105" sldId="257"/>
+            <ac:grpSpMk id="185" creationId="{78F1E66F-4E4C-4B34-BA7C-1655044F4CB8}"/>
+          </ac:grpSpMkLst>
+        </pc:grpChg>
+        <pc:grpChg chg="mod">
+          <ac:chgData name="Ad Gerrits" userId="dea84a69e24d5d19" providerId="LiveId" clId="{F37CBAFA-4AA0-463F-B6CC-2800004C0261}" dt="2022-11-06T13:35:01.908" v="0"/>
+          <ac:grpSpMkLst>
+            <pc:docMk/>
+            <pc:sldMk cId="1567708105" sldId="257"/>
+            <ac:grpSpMk id="196" creationId="{21E582AA-631B-C58C-4D7C-FD0AAFBDE3F7}"/>
+          </ac:grpSpMkLst>
+        </pc:grpChg>
+        <pc:grpChg chg="mod">
+          <ac:chgData name="Ad Gerrits" userId="dea84a69e24d5d19" providerId="LiveId" clId="{F37CBAFA-4AA0-463F-B6CC-2800004C0261}" dt="2022-11-06T13:35:01.908" v="0"/>
+          <ac:grpSpMkLst>
+            <pc:docMk/>
+            <pc:sldMk cId="1567708105" sldId="257"/>
+            <ac:grpSpMk id="197" creationId="{5473D9CA-FC37-185A-EBD7-1FC6D2FE12D9}"/>
+          </ac:grpSpMkLst>
+        </pc:grpChg>
+        <pc:grpChg chg="mod">
+          <ac:chgData name="Ad Gerrits" userId="dea84a69e24d5d19" providerId="LiveId" clId="{F37CBAFA-4AA0-463F-B6CC-2800004C0261}" dt="2022-11-06T13:35:01.908" v="0"/>
+          <ac:grpSpMkLst>
+            <pc:docMk/>
+            <pc:sldMk cId="1567708105" sldId="257"/>
+            <ac:grpSpMk id="201" creationId="{4414DA58-B5BC-E52A-CB25-614DD8AE5A25}"/>
+          </ac:grpSpMkLst>
+        </pc:grpChg>
+        <pc:grpChg chg="mod">
+          <ac:chgData name="Ad Gerrits" userId="dea84a69e24d5d19" providerId="LiveId" clId="{F37CBAFA-4AA0-463F-B6CC-2800004C0261}" dt="2022-11-06T13:35:01.908" v="0"/>
+          <ac:grpSpMkLst>
+            <pc:docMk/>
+            <pc:sldMk cId="1567708105" sldId="257"/>
+            <ac:grpSpMk id="204" creationId="{35464928-2555-1B4B-76CB-C9E60B33C83E}"/>
+          </ac:grpSpMkLst>
+        </pc:grpChg>
+        <pc:grpChg chg="mod">
+          <ac:chgData name="Ad Gerrits" userId="dea84a69e24d5d19" providerId="LiveId" clId="{F37CBAFA-4AA0-463F-B6CC-2800004C0261}" dt="2022-11-06T13:35:01.908" v="0"/>
+          <ac:grpSpMkLst>
+            <pc:docMk/>
+            <pc:sldMk cId="1567708105" sldId="257"/>
+            <ac:grpSpMk id="207" creationId="{D7CDA110-C464-8FB2-A0D9-B85F13C4F687}"/>
+          </ac:grpSpMkLst>
+        </pc:grpChg>
+        <pc:grpChg chg="mod">
+          <ac:chgData name="Ad Gerrits" userId="dea84a69e24d5d19" providerId="LiveId" clId="{F37CBAFA-4AA0-463F-B6CC-2800004C0261}" dt="2022-11-06T13:35:01.908" v="0"/>
+          <ac:grpSpMkLst>
+            <pc:docMk/>
+            <pc:sldMk cId="1567708105" sldId="257"/>
+            <ac:grpSpMk id="210" creationId="{7B0260E2-5D76-5415-453B-E9AB7E144D29}"/>
+          </ac:grpSpMkLst>
+        </pc:grpChg>
+        <pc:cxnChg chg="mod">
+          <ac:chgData name="Ad Gerrits" userId="dea84a69e24d5d19" providerId="LiveId" clId="{F37CBAFA-4AA0-463F-B6CC-2800004C0261}" dt="2022-11-06T13:35:01.908" v="0"/>
+          <ac:cxnSpMkLst>
+            <pc:docMk/>
+            <pc:sldMk cId="1567708105" sldId="257"/>
+            <ac:cxnSpMk id="208" creationId="{74A93E6C-E396-4B7F-ADA4-EF008B7FF048}"/>
+          </ac:cxnSpMkLst>
+        </pc:cxnChg>
+        <pc:cxnChg chg="mod">
+          <ac:chgData name="Ad Gerrits" userId="dea84a69e24d5d19" providerId="LiveId" clId="{F37CBAFA-4AA0-463F-B6CC-2800004C0261}" dt="2022-11-06T13:35:01.908" v="0"/>
+          <ac:cxnSpMkLst>
+            <pc:docMk/>
+            <pc:sldMk cId="1567708105" sldId="257"/>
+            <ac:cxnSpMk id="209" creationId="{0B0FC3C1-635C-D614-13B1-01881B472393}"/>
+          </ac:cxnSpMkLst>
+        </pc:cxnChg>
+        <pc:cxnChg chg="mod">
+          <ac:chgData name="Ad Gerrits" userId="dea84a69e24d5d19" providerId="LiveId" clId="{F37CBAFA-4AA0-463F-B6CC-2800004C0261}" dt="2022-11-06T13:35:01.908" v="0"/>
+          <ac:cxnSpMkLst>
+            <pc:docMk/>
+            <pc:sldMk cId="1567708105" sldId="257"/>
+            <ac:cxnSpMk id="211" creationId="{F7E564E3-1D0C-DB7C-8CA7-5FEFDD6CD0EF}"/>
+          </ac:cxnSpMkLst>
+        </pc:cxnChg>
+        <pc:cxnChg chg="mod">
+          <ac:chgData name="Ad Gerrits" userId="dea84a69e24d5d19" providerId="LiveId" clId="{F37CBAFA-4AA0-463F-B6CC-2800004C0261}" dt="2022-11-06T13:35:01.908" v="0"/>
+          <ac:cxnSpMkLst>
+            <pc:docMk/>
+            <pc:sldMk cId="1567708105" sldId="257"/>
+            <ac:cxnSpMk id="213" creationId="{35700B44-83B3-488C-2B1F-867B6C504464}"/>
+          </ac:cxnSpMkLst>
+        </pc:cxnChg>
+      </pc:sldChg>
+      <pc:sldChg chg="modSp">
+        <pc:chgData name="Ad Gerrits" userId="dea84a69e24d5d19" providerId="LiveId" clId="{F37CBAFA-4AA0-463F-B6CC-2800004C0261}" dt="2022-11-06T13:40:03.469" v="42"/>
+        <pc:sldMkLst>
+          <pc:docMk/>
+          <pc:sldMk cId="2881224712" sldId="258"/>
+        </pc:sldMkLst>
+        <pc:spChg chg="mod">
+          <ac:chgData name="Ad Gerrits" userId="dea84a69e24d5d19" providerId="LiveId" clId="{F37CBAFA-4AA0-463F-B6CC-2800004C0261}" dt="2022-11-06T13:40:03.469" v="42"/>
+          <ac:spMkLst>
+            <pc:docMk/>
+            <pc:sldMk cId="2881224712" sldId="258"/>
+            <ac:spMk id="18" creationId="{CE554121-429B-4522-95BB-49EF3B34D291}"/>
+          </ac:spMkLst>
+        </pc:spChg>
+        <pc:spChg chg="mod">
+          <ac:chgData name="Ad Gerrits" userId="dea84a69e24d5d19" providerId="LiveId" clId="{F37CBAFA-4AA0-463F-B6CC-2800004C0261}" dt="2022-11-06T13:40:03.469" v="42"/>
+          <ac:spMkLst>
+            <pc:docMk/>
+            <pc:sldMk cId="2881224712" sldId="258"/>
+            <ac:spMk id="51" creationId="{2B09E738-DC0B-457A-BF08-A564E1F8396E}"/>
+          </ac:spMkLst>
+        </pc:spChg>
+        <pc:spChg chg="mod">
+          <ac:chgData name="Ad Gerrits" userId="dea84a69e24d5d19" providerId="LiveId" clId="{F37CBAFA-4AA0-463F-B6CC-2800004C0261}" dt="2022-11-06T13:40:03.469" v="42"/>
+          <ac:spMkLst>
+            <pc:docMk/>
+            <pc:sldMk cId="2881224712" sldId="258"/>
+            <ac:spMk id="60" creationId="{FFE12D62-F5BD-42FC-9AC7-A5E9E9C45DA3}"/>
+          </ac:spMkLst>
+        </pc:spChg>
+        <pc:grpChg chg="mod">
+          <ac:chgData name="Ad Gerrits" userId="dea84a69e24d5d19" providerId="LiveId" clId="{F37CBAFA-4AA0-463F-B6CC-2800004C0261}" dt="2022-11-06T13:40:03.469" v="42"/>
+          <ac:grpSpMkLst>
+            <pc:docMk/>
+            <pc:sldMk cId="2881224712" sldId="258"/>
+            <ac:grpSpMk id="4" creationId="{EFCB5AED-59DA-4E61-86D2-7BA6891D3A2E}"/>
+          </ac:grpSpMkLst>
+        </pc:grpChg>
+        <pc:grpChg chg="mod">
+          <ac:chgData name="Ad Gerrits" userId="dea84a69e24d5d19" providerId="LiveId" clId="{F37CBAFA-4AA0-463F-B6CC-2800004C0261}" dt="2022-11-06T13:40:03.469" v="42"/>
+          <ac:grpSpMkLst>
+            <pc:docMk/>
+            <pc:sldMk cId="2881224712" sldId="258"/>
+            <ac:grpSpMk id="7" creationId="{EABDF61D-C77F-4B87-8517-81A47D04BEF6}"/>
+          </ac:grpSpMkLst>
+        </pc:grpChg>
+        <pc:grpChg chg="mod">
+          <ac:chgData name="Ad Gerrits" userId="dea84a69e24d5d19" providerId="LiveId" clId="{F37CBAFA-4AA0-463F-B6CC-2800004C0261}" dt="2022-11-06T13:40:03.469" v="42"/>
+          <ac:grpSpMkLst>
+            <pc:docMk/>
+            <pc:sldMk cId="2881224712" sldId="258"/>
+            <ac:grpSpMk id="12" creationId="{D7E52BEC-528D-4D0C-A2D3-7976B977D4D9}"/>
+          </ac:grpSpMkLst>
+        </pc:grpChg>
+        <pc:grpChg chg="mod">
+          <ac:chgData name="Ad Gerrits" userId="dea84a69e24d5d19" providerId="LiveId" clId="{F37CBAFA-4AA0-463F-B6CC-2800004C0261}" dt="2022-11-06T13:40:03.469" v="42"/>
+          <ac:grpSpMkLst>
+            <pc:docMk/>
+            <pc:sldMk cId="2881224712" sldId="258"/>
+            <ac:grpSpMk id="15" creationId="{3E398007-9B6F-4FC4-A810-936A3217F7A6}"/>
+          </ac:grpSpMkLst>
+        </pc:grpChg>
+        <pc:grpChg chg="mod">
+          <ac:chgData name="Ad Gerrits" userId="dea84a69e24d5d19" providerId="LiveId" clId="{F37CBAFA-4AA0-463F-B6CC-2800004C0261}" dt="2022-11-06T13:40:03.469" v="42"/>
+          <ac:grpSpMkLst>
+            <pc:docMk/>
+            <pc:sldMk cId="2881224712" sldId="258"/>
+            <ac:grpSpMk id="19" creationId="{4F5CF997-CC4B-42AA-8B04-A0D0E30D4D6E}"/>
+          </ac:grpSpMkLst>
+        </pc:grpChg>
+        <pc:grpChg chg="mod">
+          <ac:chgData name="Ad Gerrits" userId="dea84a69e24d5d19" providerId="LiveId" clId="{F37CBAFA-4AA0-463F-B6CC-2800004C0261}" dt="2022-11-06T13:40:03.469" v="42"/>
+          <ac:grpSpMkLst>
+            <pc:docMk/>
+            <pc:sldMk cId="2881224712" sldId="258"/>
+            <ac:grpSpMk id="22" creationId="{AE7BBB60-FE51-41FC-921F-E486973B128E}"/>
+          </ac:grpSpMkLst>
+        </pc:grpChg>
+        <pc:grpChg chg="mod">
+          <ac:chgData name="Ad Gerrits" userId="dea84a69e24d5d19" providerId="LiveId" clId="{F37CBAFA-4AA0-463F-B6CC-2800004C0261}" dt="2022-11-06T13:40:03.469" v="42"/>
+          <ac:grpSpMkLst>
+            <pc:docMk/>
+            <pc:sldMk cId="2881224712" sldId="258"/>
+            <ac:grpSpMk id="28" creationId="{C8FE67FE-E771-4639-91B1-4D77310A7FF9}"/>
+          </ac:grpSpMkLst>
+        </pc:grpChg>
+        <pc:grpChg chg="mod">
+          <ac:chgData name="Ad Gerrits" userId="dea84a69e24d5d19" providerId="LiveId" clId="{F37CBAFA-4AA0-463F-B6CC-2800004C0261}" dt="2022-11-06T13:40:03.469" v="42"/>
+          <ac:grpSpMkLst>
+            <pc:docMk/>
+            <pc:sldMk cId="2881224712" sldId="258"/>
+            <ac:grpSpMk id="36" creationId="{F11292C0-E446-4437-8E39-C31465D5A01B}"/>
+          </ac:grpSpMkLst>
+        </pc:grpChg>
+        <pc:grpChg chg="mod">
+          <ac:chgData name="Ad Gerrits" userId="dea84a69e24d5d19" providerId="LiveId" clId="{F37CBAFA-4AA0-463F-B6CC-2800004C0261}" dt="2022-11-06T13:40:03.469" v="42"/>
+          <ac:grpSpMkLst>
+            <pc:docMk/>
+            <pc:sldMk cId="2881224712" sldId="258"/>
+            <ac:grpSpMk id="41" creationId="{C6C64E5A-014B-43E1-B916-328A739D75D1}"/>
+          </ac:grpSpMkLst>
+        </pc:grpChg>
+        <pc:grpChg chg="mod">
+          <ac:chgData name="Ad Gerrits" userId="dea84a69e24d5d19" providerId="LiveId" clId="{F37CBAFA-4AA0-463F-B6CC-2800004C0261}" dt="2022-11-06T13:40:03.469" v="42"/>
+          <ac:grpSpMkLst>
+            <pc:docMk/>
+            <pc:sldMk cId="2881224712" sldId="258"/>
+            <ac:grpSpMk id="48" creationId="{9B3BB621-F2E5-417D-AF4B-3CBBDFDCB3F6}"/>
+          </ac:grpSpMkLst>
+        </pc:grpChg>
+        <pc:grpChg chg="mod">
+          <ac:chgData name="Ad Gerrits" userId="dea84a69e24d5d19" providerId="LiveId" clId="{F37CBAFA-4AA0-463F-B6CC-2800004C0261}" dt="2022-11-06T13:40:03.469" v="42"/>
+          <ac:grpSpMkLst>
+            <pc:docMk/>
+            <pc:sldMk cId="2881224712" sldId="258"/>
+            <ac:grpSpMk id="52" creationId="{0C6A9D9A-6BD5-468E-8B54-B182EB6697FF}"/>
+          </ac:grpSpMkLst>
+        </pc:grpChg>
+        <pc:grpChg chg="mod">
+          <ac:chgData name="Ad Gerrits" userId="dea84a69e24d5d19" providerId="LiveId" clId="{F37CBAFA-4AA0-463F-B6CC-2800004C0261}" dt="2022-11-06T13:40:03.469" v="42"/>
+          <ac:grpSpMkLst>
+            <pc:docMk/>
+            <pc:sldMk cId="2881224712" sldId="258"/>
+            <ac:grpSpMk id="57" creationId="{5FBB0231-99AC-421A-8651-A0251432C999}"/>
+          </ac:grpSpMkLst>
+        </pc:grpChg>
+        <pc:grpChg chg="mod">
+          <ac:chgData name="Ad Gerrits" userId="dea84a69e24d5d19" providerId="LiveId" clId="{F37CBAFA-4AA0-463F-B6CC-2800004C0261}" dt="2022-11-06T13:40:03.469" v="42"/>
+          <ac:grpSpMkLst>
+            <pc:docMk/>
+            <pc:sldMk cId="2881224712" sldId="258"/>
+            <ac:grpSpMk id="61" creationId="{E4F05AE9-9569-4CBA-8C56-EF6C8C709A0E}"/>
+          </ac:grpSpMkLst>
+        </pc:grpChg>
+        <pc:grpChg chg="mod">
+          <ac:chgData name="Ad Gerrits" userId="dea84a69e24d5d19" providerId="LiveId" clId="{F37CBAFA-4AA0-463F-B6CC-2800004C0261}" dt="2022-11-06T13:40:03.469" v="42"/>
+          <ac:grpSpMkLst>
+            <pc:docMk/>
+            <pc:sldMk cId="2881224712" sldId="258"/>
+            <ac:grpSpMk id="64" creationId="{CD10E5B2-CE54-457F-9F0A-EBB446399AF8}"/>
+          </ac:grpSpMkLst>
+        </pc:grpChg>
+        <pc:grpChg chg="mod">
+          <ac:chgData name="Ad Gerrits" userId="dea84a69e24d5d19" providerId="LiveId" clId="{F37CBAFA-4AA0-463F-B6CC-2800004C0261}" dt="2022-11-06T13:40:03.469" v="42"/>
+          <ac:grpSpMkLst>
+            <pc:docMk/>
+            <pc:sldMk cId="2881224712" sldId="258"/>
+            <ac:grpSpMk id="70" creationId="{1EF3072D-6875-4471-A3FF-9E467008AD1D}"/>
+          </ac:grpSpMkLst>
+        </pc:grpChg>
+        <pc:grpChg chg="mod">
+          <ac:chgData name="Ad Gerrits" userId="dea84a69e24d5d19" providerId="LiveId" clId="{F37CBAFA-4AA0-463F-B6CC-2800004C0261}" dt="2022-11-06T13:40:03.469" v="42"/>
+          <ac:grpSpMkLst>
+            <pc:docMk/>
+            <pc:sldMk cId="2881224712" sldId="258"/>
+            <ac:grpSpMk id="78" creationId="{B66983DB-375F-40FD-932E-B65E83050431}"/>
+          </ac:grpSpMkLst>
+        </pc:grpChg>
+        <pc:grpChg chg="mod">
+          <ac:chgData name="Ad Gerrits" userId="dea84a69e24d5d19" providerId="LiveId" clId="{F37CBAFA-4AA0-463F-B6CC-2800004C0261}" dt="2022-11-06T13:40:03.469" v="42"/>
+          <ac:grpSpMkLst>
+            <pc:docMk/>
+            <pc:sldMk cId="2881224712" sldId="258"/>
+            <ac:grpSpMk id="85" creationId="{9115B3D6-0D16-4551-A083-BC3E8672312B}"/>
+          </ac:grpSpMkLst>
+        </pc:grpChg>
+        <pc:grpChg chg="mod">
+          <ac:chgData name="Ad Gerrits" userId="dea84a69e24d5d19" providerId="LiveId" clId="{F37CBAFA-4AA0-463F-B6CC-2800004C0261}" dt="2022-11-06T13:40:03.469" v="42"/>
+          <ac:grpSpMkLst>
+            <pc:docMk/>
+            <pc:sldMk cId="2881224712" sldId="258"/>
+            <ac:grpSpMk id="94" creationId="{97D00EC7-F162-4B4C-B190-095D1AC6BF6B}"/>
+          </ac:grpSpMkLst>
+        </pc:grpChg>
+        <pc:grpChg chg="mod">
+          <ac:chgData name="Ad Gerrits" userId="dea84a69e24d5d19" providerId="LiveId" clId="{F37CBAFA-4AA0-463F-B6CC-2800004C0261}" dt="2022-11-06T13:40:03.469" v="42"/>
+          <ac:grpSpMkLst>
+            <pc:docMk/>
+            <pc:sldMk cId="2881224712" sldId="258"/>
+            <ac:grpSpMk id="100" creationId="{10544CAE-8458-438F-9F06-80C935038BE7}"/>
+          </ac:grpSpMkLst>
+        </pc:grpChg>
+      </pc:sldChg>
+      <pc:sldChg chg="modSp">
+        <pc:chgData name="Ad Gerrits" userId="dea84a69e24d5d19" providerId="LiveId" clId="{F37CBAFA-4AA0-463F-B6CC-2800004C0261}" dt="2022-11-06T13:40:17.071" v="43"/>
+        <pc:sldMkLst>
+          <pc:docMk/>
+          <pc:sldMk cId="2605663850" sldId="259"/>
+        </pc:sldMkLst>
+        <pc:spChg chg="mod">
+          <ac:chgData name="Ad Gerrits" userId="dea84a69e24d5d19" providerId="LiveId" clId="{F37CBAFA-4AA0-463F-B6CC-2800004C0261}" dt="2022-11-06T13:40:17.071" v="43"/>
+          <ac:spMkLst>
+            <pc:docMk/>
+            <pc:sldMk cId="2605663850" sldId="259"/>
+            <ac:spMk id="10" creationId="{CE4FBB24-7EA4-4CB2-BE11-A284075EEFAF}"/>
+          </ac:spMkLst>
+        </pc:spChg>
+        <pc:spChg chg="mod">
+          <ac:chgData name="Ad Gerrits" userId="dea84a69e24d5d19" providerId="LiveId" clId="{F37CBAFA-4AA0-463F-B6CC-2800004C0261}" dt="2022-11-06T13:40:17.071" v="43"/>
+          <ac:spMkLst>
+            <pc:docMk/>
+            <pc:sldMk cId="2605663850" sldId="259"/>
+            <ac:spMk id="19" creationId="{FE43EEE4-2FC9-4139-9967-DF8F9ECEA5B9}"/>
+          </ac:spMkLst>
+        </pc:spChg>
+        <pc:grpChg chg="mod">
+          <ac:chgData name="Ad Gerrits" userId="dea84a69e24d5d19" providerId="LiveId" clId="{F37CBAFA-4AA0-463F-B6CC-2800004C0261}" dt="2022-11-06T13:40:17.071" v="43"/>
+          <ac:grpSpMkLst>
+            <pc:docMk/>
+            <pc:sldMk cId="2605663850" sldId="259"/>
+            <ac:grpSpMk id="4" creationId="{AB200B70-2BD0-428C-B0D2-432E4F4FF88E}"/>
+          </ac:grpSpMkLst>
+        </pc:grpChg>
+        <pc:grpChg chg="mod">
+          <ac:chgData name="Ad Gerrits" userId="dea84a69e24d5d19" providerId="LiveId" clId="{F37CBAFA-4AA0-463F-B6CC-2800004C0261}" dt="2022-11-06T13:40:17.071" v="43"/>
+          <ac:grpSpMkLst>
+            <pc:docMk/>
+            <pc:sldMk cId="2605663850" sldId="259"/>
+            <ac:grpSpMk id="7" creationId="{C0A2B2B9-62DD-4384-8FE5-D99EDC937EF7}"/>
+          </ac:grpSpMkLst>
+        </pc:grpChg>
+        <pc:grpChg chg="mod">
+          <ac:chgData name="Ad Gerrits" userId="dea84a69e24d5d19" providerId="LiveId" clId="{F37CBAFA-4AA0-463F-B6CC-2800004C0261}" dt="2022-11-06T13:40:17.071" v="43"/>
+          <ac:grpSpMkLst>
+            <pc:docMk/>
+            <pc:sldMk cId="2605663850" sldId="259"/>
+            <ac:grpSpMk id="11" creationId="{722FD1FD-1BD7-47CC-974A-24D70F48C62D}"/>
+          </ac:grpSpMkLst>
+        </pc:grpChg>
+        <pc:grpChg chg="mod">
+          <ac:chgData name="Ad Gerrits" userId="dea84a69e24d5d19" providerId="LiveId" clId="{F37CBAFA-4AA0-463F-B6CC-2800004C0261}" dt="2022-11-06T13:40:17.071" v="43"/>
+          <ac:grpSpMkLst>
+            <pc:docMk/>
+            <pc:sldMk cId="2605663850" sldId="259"/>
+            <ac:grpSpMk id="16" creationId="{CFA5AFC3-9C97-4EAC-95D0-FAC4EAA36DE8}"/>
+          </ac:grpSpMkLst>
+        </pc:grpChg>
+        <pc:grpChg chg="mod">
+          <ac:chgData name="Ad Gerrits" userId="dea84a69e24d5d19" providerId="LiveId" clId="{F37CBAFA-4AA0-463F-B6CC-2800004C0261}" dt="2022-11-06T13:40:17.071" v="43"/>
+          <ac:grpSpMkLst>
+            <pc:docMk/>
+            <pc:sldMk cId="2605663850" sldId="259"/>
+            <ac:grpSpMk id="20" creationId="{AD1EF48B-E9A6-41D6-A492-30012D70A34D}"/>
+          </ac:grpSpMkLst>
+        </pc:grpChg>
+        <pc:grpChg chg="mod">
+          <ac:chgData name="Ad Gerrits" userId="dea84a69e24d5d19" providerId="LiveId" clId="{F37CBAFA-4AA0-463F-B6CC-2800004C0261}" dt="2022-11-06T13:40:17.071" v="43"/>
+          <ac:grpSpMkLst>
+            <pc:docMk/>
+            <pc:sldMk cId="2605663850" sldId="259"/>
+            <ac:grpSpMk id="23" creationId="{2EAD2BDA-9893-4A80-9514-49FD53C96564}"/>
+          </ac:grpSpMkLst>
+        </pc:grpChg>
+        <pc:grpChg chg="mod">
+          <ac:chgData name="Ad Gerrits" userId="dea84a69e24d5d19" providerId="LiveId" clId="{F37CBAFA-4AA0-463F-B6CC-2800004C0261}" dt="2022-11-06T13:40:17.071" v="43"/>
+          <ac:grpSpMkLst>
+            <pc:docMk/>
+            <pc:sldMk cId="2605663850" sldId="259"/>
+            <ac:grpSpMk id="29" creationId="{6C99FE23-D79E-47F2-9985-6985F6FEBEE8}"/>
+          </ac:grpSpMkLst>
+        </pc:grpChg>
+        <pc:grpChg chg="mod">
+          <ac:chgData name="Ad Gerrits" userId="dea84a69e24d5d19" providerId="LiveId" clId="{F37CBAFA-4AA0-463F-B6CC-2800004C0261}" dt="2022-11-06T13:40:17.071" v="43"/>
+          <ac:grpSpMkLst>
+            <pc:docMk/>
+            <pc:sldMk cId="2605663850" sldId="259"/>
+            <ac:grpSpMk id="37" creationId="{3DC3272C-AE2F-4C7F-8000-6FF6FF96CAA5}"/>
+          </ac:grpSpMkLst>
+        </pc:grpChg>
+        <pc:grpChg chg="mod">
+          <ac:chgData name="Ad Gerrits" userId="dea84a69e24d5d19" providerId="LiveId" clId="{F37CBAFA-4AA0-463F-B6CC-2800004C0261}" dt="2022-11-06T13:40:17.071" v="43"/>
+          <ac:grpSpMkLst>
+            <pc:docMk/>
+            <pc:sldMk cId="2605663850" sldId="259"/>
+            <ac:grpSpMk id="42" creationId="{58EA9739-AB86-42DC-B00E-ABDC670C2775}"/>
+          </ac:grpSpMkLst>
+        </pc:grpChg>
+        <pc:grpChg chg="mod">
+          <ac:chgData name="Ad Gerrits" userId="dea84a69e24d5d19" providerId="LiveId" clId="{F37CBAFA-4AA0-463F-B6CC-2800004C0261}" dt="2022-11-06T13:40:17.071" v="43"/>
+          <ac:grpSpMkLst>
+            <pc:docMk/>
+            <pc:sldMk cId="2605663850" sldId="259"/>
+            <ac:grpSpMk id="49" creationId="{5B0AC7DB-C97D-4879-99E8-4747391B6A88}"/>
+          </ac:grpSpMkLst>
+        </pc:grpChg>
+        <pc:grpChg chg="mod">
+          <ac:chgData name="Ad Gerrits" userId="dea84a69e24d5d19" providerId="LiveId" clId="{F37CBAFA-4AA0-463F-B6CC-2800004C0261}" dt="2022-11-06T13:40:17.071" v="43"/>
+          <ac:grpSpMkLst>
+            <pc:docMk/>
+            <pc:sldMk cId="2605663850" sldId="259"/>
+            <ac:grpSpMk id="55" creationId="{8185DFB0-25C8-4C16-B031-E72D7E3B5943}"/>
+          </ac:grpSpMkLst>
+        </pc:grpChg>
+        <pc:grpChg chg="mod">
+          <ac:chgData name="Ad Gerrits" userId="dea84a69e24d5d19" providerId="LiveId" clId="{F37CBAFA-4AA0-463F-B6CC-2800004C0261}" dt="2022-11-06T13:40:17.071" v="43"/>
+          <ac:grpSpMkLst>
+            <pc:docMk/>
+            <pc:sldMk cId="2605663850" sldId="259"/>
+            <ac:grpSpMk id="63" creationId="{D6788201-1C87-4DFB-A8EC-52DA7A643696}"/>
+          </ac:grpSpMkLst>
+        </pc:grpChg>
+        <pc:grpChg chg="mod">
+          <ac:chgData name="Ad Gerrits" userId="dea84a69e24d5d19" providerId="LiveId" clId="{F37CBAFA-4AA0-463F-B6CC-2800004C0261}" dt="2022-11-06T13:40:17.071" v="43"/>
+          <ac:grpSpMkLst>
+            <pc:docMk/>
+            <pc:sldMk cId="2605663850" sldId="259"/>
+            <ac:grpSpMk id="70" creationId="{027A5EEA-43B5-4FAF-AAE6-816C285A63AB}"/>
+          </ac:grpSpMkLst>
+        </pc:grpChg>
+        <pc:grpChg chg="mod">
+          <ac:chgData name="Ad Gerrits" userId="dea84a69e24d5d19" providerId="LiveId" clId="{F37CBAFA-4AA0-463F-B6CC-2800004C0261}" dt="2022-11-06T13:40:17.071" v="43"/>
+          <ac:grpSpMkLst>
+            <pc:docMk/>
+            <pc:sldMk cId="2605663850" sldId="259"/>
+            <ac:grpSpMk id="79" creationId="{848CEB13-3E55-41B6-ACD2-B257E52CF73D}"/>
+          </ac:grpSpMkLst>
+        </pc:grpChg>
+        <pc:grpChg chg="mod">
+          <ac:chgData name="Ad Gerrits" userId="dea84a69e24d5d19" providerId="LiveId" clId="{F37CBAFA-4AA0-463F-B6CC-2800004C0261}" dt="2022-11-06T13:40:17.071" v="43"/>
+          <ac:grpSpMkLst>
+            <pc:docMk/>
+            <pc:sldMk cId="2605663850" sldId="259"/>
+            <ac:grpSpMk id="83" creationId="{8A6A20BE-ADBD-4E10-B3FB-745A1B9BC882}"/>
+          </ac:grpSpMkLst>
+        </pc:grpChg>
+      </pc:sldChg>
+      <pc:sldChg chg="modSp">
+        <pc:chgData name="Ad Gerrits" userId="dea84a69e24d5d19" providerId="LiveId" clId="{F37CBAFA-4AA0-463F-B6CC-2800004C0261}" dt="2022-11-06T13:40:26.309" v="44"/>
+        <pc:sldMkLst>
+          <pc:docMk/>
+          <pc:sldMk cId="3740034590" sldId="260"/>
+        </pc:sldMkLst>
+        <pc:spChg chg="mod">
+          <ac:chgData name="Ad Gerrits" userId="dea84a69e24d5d19" providerId="LiveId" clId="{F37CBAFA-4AA0-463F-B6CC-2800004C0261}" dt="2022-11-06T13:40:26.309" v="44"/>
+          <ac:spMkLst>
+            <pc:docMk/>
+            <pc:sldMk cId="3740034590" sldId="260"/>
+            <ac:spMk id="8" creationId="{6C946D52-7E57-4E11-9AA0-8424C7C63ECD}"/>
+          </ac:spMkLst>
+        </pc:spChg>
+        <pc:spChg chg="mod">
+          <ac:chgData name="Ad Gerrits" userId="dea84a69e24d5d19" providerId="LiveId" clId="{F37CBAFA-4AA0-463F-B6CC-2800004C0261}" dt="2022-11-06T13:40:26.309" v="44"/>
+          <ac:spMkLst>
+            <pc:docMk/>
+            <pc:sldMk cId="3740034590" sldId="260"/>
+            <ac:spMk id="17" creationId="{F3B34880-4A3F-4700-9FB4-0DF46B071A8E}"/>
+          </ac:spMkLst>
+        </pc:spChg>
+        <pc:spChg chg="mod">
+          <ac:chgData name="Ad Gerrits" userId="dea84a69e24d5d19" providerId="LiveId" clId="{F37CBAFA-4AA0-463F-B6CC-2800004C0261}" dt="2022-11-06T13:40:26.309" v="44"/>
+          <ac:spMkLst>
+            <pc:docMk/>
+            <pc:sldMk cId="3740034590" sldId="260"/>
+            <ac:spMk id="77" creationId="{93378BCB-EB3B-4DA9-850D-4FC06104E95C}"/>
+          </ac:spMkLst>
+        </pc:spChg>
+        <pc:spChg chg="mod">
+          <ac:chgData name="Ad Gerrits" userId="dea84a69e24d5d19" providerId="LiveId" clId="{F37CBAFA-4AA0-463F-B6CC-2800004C0261}" dt="2022-11-06T13:40:26.309" v="44"/>
+          <ac:spMkLst>
+            <pc:docMk/>
+            <pc:sldMk cId="3740034590" sldId="260"/>
+            <ac:spMk id="78" creationId="{68F4379E-8B84-4254-81C7-B8ED3E9F3E0B}"/>
+          </ac:spMkLst>
+        </pc:spChg>
+        <pc:spChg chg="mod">
+          <ac:chgData name="Ad Gerrits" userId="dea84a69e24d5d19" providerId="LiveId" clId="{F37CBAFA-4AA0-463F-B6CC-2800004C0261}" dt="2022-11-06T13:40:26.309" v="44"/>
+          <ac:spMkLst>
+            <pc:docMk/>
+            <pc:sldMk cId="3740034590" sldId="260"/>
+            <ac:spMk id="79" creationId="{9EB8DDF6-D51E-4343-9FF3-37FCFC540526}"/>
+          </ac:spMkLst>
+        </pc:spChg>
+        <pc:spChg chg="mod">
+          <ac:chgData name="Ad Gerrits" userId="dea84a69e24d5d19" providerId="LiveId" clId="{F37CBAFA-4AA0-463F-B6CC-2800004C0261}" dt="2022-11-06T13:40:26.309" v="44"/>
+          <ac:spMkLst>
+            <pc:docMk/>
+            <pc:sldMk cId="3740034590" sldId="260"/>
+            <ac:spMk id="80" creationId="{E90AE561-A765-4790-93AF-33D8EACA8119}"/>
+          </ac:spMkLst>
+        </pc:spChg>
+        <pc:spChg chg="mod">
+          <ac:chgData name="Ad Gerrits" userId="dea84a69e24d5d19" providerId="LiveId" clId="{F37CBAFA-4AA0-463F-B6CC-2800004C0261}" dt="2022-11-06T13:40:26.309" v="44"/>
+          <ac:spMkLst>
+            <pc:docMk/>
+            <pc:sldMk cId="3740034590" sldId="260"/>
+            <ac:spMk id="97" creationId="{F75462B6-01DA-4D1E-B434-3007502C0B4C}"/>
+          </ac:spMkLst>
+        </pc:spChg>
+        <pc:spChg chg="mod">
+          <ac:chgData name="Ad Gerrits" userId="dea84a69e24d5d19" providerId="LiveId" clId="{F37CBAFA-4AA0-463F-B6CC-2800004C0261}" dt="2022-11-06T13:40:26.309" v="44"/>
+          <ac:spMkLst>
+            <pc:docMk/>
+            <pc:sldMk cId="3740034590" sldId="260"/>
+            <ac:spMk id="102" creationId="{09EE787E-CFCF-4664-AF8B-B79512315040}"/>
+          </ac:spMkLst>
+        </pc:spChg>
+        <pc:spChg chg="mod">
+          <ac:chgData name="Ad Gerrits" userId="dea84a69e24d5d19" providerId="LiveId" clId="{F37CBAFA-4AA0-463F-B6CC-2800004C0261}" dt="2022-11-06T13:40:26.309" v="44"/>
+          <ac:spMkLst>
+            <pc:docMk/>
+            <pc:sldMk cId="3740034590" sldId="260"/>
+            <ac:spMk id="118" creationId="{C102122F-5E8E-49A8-ABAD-CEFD2A890D62}"/>
+          </ac:spMkLst>
+        </pc:spChg>
+        <pc:grpChg chg="mod">
+          <ac:chgData name="Ad Gerrits" userId="dea84a69e24d5d19" providerId="LiveId" clId="{F37CBAFA-4AA0-463F-B6CC-2800004C0261}" dt="2022-11-06T13:40:26.309" v="44"/>
+          <ac:grpSpMkLst>
+            <pc:docMk/>
+            <pc:sldMk cId="3740034590" sldId="260"/>
+            <ac:grpSpMk id="5" creationId="{CA2E3563-50F6-4640-83B3-93773C9CDCD7}"/>
+          </ac:grpSpMkLst>
+        </pc:grpChg>
+        <pc:grpChg chg="mod">
+          <ac:chgData name="Ad Gerrits" userId="dea84a69e24d5d19" providerId="LiveId" clId="{F37CBAFA-4AA0-463F-B6CC-2800004C0261}" dt="2022-11-06T13:40:26.309" v="44"/>
+          <ac:grpSpMkLst>
+            <pc:docMk/>
+            <pc:sldMk cId="3740034590" sldId="260"/>
+            <ac:grpSpMk id="9" creationId="{28903AB1-E5A0-4ABC-94AF-1E8D3745BA8F}"/>
+          </ac:grpSpMkLst>
+        </pc:grpChg>
+        <pc:grpChg chg="mod">
+          <ac:chgData name="Ad Gerrits" userId="dea84a69e24d5d19" providerId="LiveId" clId="{F37CBAFA-4AA0-463F-B6CC-2800004C0261}" dt="2022-11-06T13:40:26.309" v="44"/>
+          <ac:grpSpMkLst>
+            <pc:docMk/>
+            <pc:sldMk cId="3740034590" sldId="260"/>
+            <ac:grpSpMk id="14" creationId="{8F8F4806-B991-4E07-8B5C-A20FB96DCF16}"/>
+          </ac:grpSpMkLst>
+        </pc:grpChg>
+        <pc:grpChg chg="mod">
+          <ac:chgData name="Ad Gerrits" userId="dea84a69e24d5d19" providerId="LiveId" clId="{F37CBAFA-4AA0-463F-B6CC-2800004C0261}" dt="2022-11-06T13:40:26.309" v="44"/>
+          <ac:grpSpMkLst>
+            <pc:docMk/>
+            <pc:sldMk cId="3740034590" sldId="260"/>
+            <ac:grpSpMk id="18" creationId="{1C4562D6-BCD6-4496-8B35-417386C0C688}"/>
+          </ac:grpSpMkLst>
+        </pc:grpChg>
+        <pc:grpChg chg="mod">
+          <ac:chgData name="Ad Gerrits" userId="dea84a69e24d5d19" providerId="LiveId" clId="{F37CBAFA-4AA0-463F-B6CC-2800004C0261}" dt="2022-11-06T13:40:26.309" v="44"/>
+          <ac:grpSpMkLst>
+            <pc:docMk/>
+            <pc:sldMk cId="3740034590" sldId="260"/>
+            <ac:grpSpMk id="21" creationId="{79D21254-3B0B-4A5D-81CE-4C02C4B49C73}"/>
+          </ac:grpSpMkLst>
+        </pc:grpChg>
+        <pc:grpChg chg="mod">
+          <ac:chgData name="Ad Gerrits" userId="dea84a69e24d5d19" providerId="LiveId" clId="{F37CBAFA-4AA0-463F-B6CC-2800004C0261}" dt="2022-11-06T13:40:26.309" v="44"/>
+          <ac:grpSpMkLst>
+            <pc:docMk/>
+            <pc:sldMk cId="3740034590" sldId="260"/>
+            <ac:grpSpMk id="26" creationId="{608B64F9-EC1B-4661-876B-A16EC844ADEA}"/>
+          </ac:grpSpMkLst>
+        </pc:grpChg>
+        <pc:grpChg chg="mod">
+          <ac:chgData name="Ad Gerrits" userId="dea84a69e24d5d19" providerId="LiveId" clId="{F37CBAFA-4AA0-463F-B6CC-2800004C0261}" dt="2022-11-06T13:40:26.309" v="44"/>
+          <ac:grpSpMkLst>
+            <pc:docMk/>
+            <pc:sldMk cId="3740034590" sldId="260"/>
+            <ac:grpSpMk id="33" creationId="{8D3ECD37-8181-48D5-BE2A-16B3BE9C9514}"/>
+          </ac:grpSpMkLst>
+        </pc:grpChg>
+        <pc:grpChg chg="mod">
+          <ac:chgData name="Ad Gerrits" userId="dea84a69e24d5d19" providerId="LiveId" clId="{F37CBAFA-4AA0-463F-B6CC-2800004C0261}" dt="2022-11-06T13:40:26.309" v="44"/>
+          <ac:grpSpMkLst>
+            <pc:docMk/>
+            <pc:sldMk cId="3740034590" sldId="260"/>
+            <ac:grpSpMk id="39" creationId="{726E859B-8EF1-4075-8112-D916B216EB1D}"/>
+          </ac:grpSpMkLst>
+        </pc:grpChg>
+        <pc:grpChg chg="mod">
+          <ac:chgData name="Ad Gerrits" userId="dea84a69e24d5d19" providerId="LiveId" clId="{F37CBAFA-4AA0-463F-B6CC-2800004C0261}" dt="2022-11-06T13:40:26.309" v="44"/>
+          <ac:grpSpMkLst>
+            <pc:docMk/>
+            <pc:sldMk cId="3740034590" sldId="260"/>
+            <ac:grpSpMk id="47" creationId="{BE316C47-2FD7-4EC4-A976-F429B7DA9B22}"/>
+          </ac:grpSpMkLst>
+        </pc:grpChg>
+        <pc:grpChg chg="mod">
+          <ac:chgData name="Ad Gerrits" userId="dea84a69e24d5d19" providerId="LiveId" clId="{F37CBAFA-4AA0-463F-B6CC-2800004C0261}" dt="2022-11-06T13:40:26.309" v="44"/>
+          <ac:grpSpMkLst>
+            <pc:docMk/>
+            <pc:sldMk cId="3740034590" sldId="260"/>
+            <ac:grpSpMk id="54" creationId="{1EBAF41F-CD8F-42E9-9FC8-8AF60A55215E}"/>
+          </ac:grpSpMkLst>
+        </pc:grpChg>
+        <pc:grpChg chg="mod">
+          <ac:chgData name="Ad Gerrits" userId="dea84a69e24d5d19" providerId="LiveId" clId="{F37CBAFA-4AA0-463F-B6CC-2800004C0261}" dt="2022-11-06T13:40:26.309" v="44"/>
+          <ac:grpSpMkLst>
+            <pc:docMk/>
+            <pc:sldMk cId="3740034590" sldId="260"/>
+            <ac:grpSpMk id="63" creationId="{01AE0053-E4CD-4724-8208-DFF435A828D0}"/>
+          </ac:grpSpMkLst>
+        </pc:grpChg>
+        <pc:grpChg chg="mod">
+          <ac:chgData name="Ad Gerrits" userId="dea84a69e24d5d19" providerId="LiveId" clId="{F37CBAFA-4AA0-463F-B6CC-2800004C0261}" dt="2022-11-06T13:40:26.309" v="44"/>
+          <ac:grpSpMkLst>
+            <pc:docMk/>
+            <pc:sldMk cId="3740034590" sldId="260"/>
+            <ac:grpSpMk id="69" creationId="{DD895B2E-63A6-4ADD-A203-69958B7A56E9}"/>
+          </ac:grpSpMkLst>
+        </pc:grpChg>
+        <pc:grpChg chg="mod">
+          <ac:chgData name="Ad Gerrits" userId="dea84a69e24d5d19" providerId="LiveId" clId="{F37CBAFA-4AA0-463F-B6CC-2800004C0261}" dt="2022-11-06T13:40:26.309" v="44"/>
+          <ac:grpSpMkLst>
+            <pc:docMk/>
+            <pc:sldMk cId="3740034590" sldId="260"/>
+            <ac:grpSpMk id="81" creationId="{08D4C89B-9F19-4753-A63C-96CEE7AE0CA6}"/>
+          </ac:grpSpMkLst>
+        </pc:grpChg>
+        <pc:grpChg chg="mod">
+          <ac:chgData name="Ad Gerrits" userId="dea84a69e24d5d19" providerId="LiveId" clId="{F37CBAFA-4AA0-463F-B6CC-2800004C0261}" dt="2022-11-06T13:40:26.309" v="44"/>
+          <ac:grpSpMkLst>
+            <pc:docMk/>
+            <pc:sldMk cId="3740034590" sldId="260"/>
+            <ac:grpSpMk id="87" creationId="{67D09619-A803-4AE5-8378-544798B3D205}"/>
+          </ac:grpSpMkLst>
+        </pc:grpChg>
+        <pc:grpChg chg="mod">
+          <ac:chgData name="Ad Gerrits" userId="dea84a69e24d5d19" providerId="LiveId" clId="{F37CBAFA-4AA0-463F-B6CC-2800004C0261}" dt="2022-11-06T13:40:26.309" v="44"/>
+          <ac:grpSpMkLst>
+            <pc:docMk/>
+            <pc:sldMk cId="3740034590" sldId="260"/>
+            <ac:grpSpMk id="93" creationId="{FD7CB0C9-9450-4204-8023-27CCAD8E8B01}"/>
+          </ac:grpSpMkLst>
+        </pc:grpChg>
+        <pc:grpChg chg="mod">
+          <ac:chgData name="Ad Gerrits" userId="dea84a69e24d5d19" providerId="LiveId" clId="{F37CBAFA-4AA0-463F-B6CC-2800004C0261}" dt="2022-11-06T13:40:26.309" v="44"/>
+          <ac:grpSpMkLst>
+            <pc:docMk/>
+            <pc:sldMk cId="3740034590" sldId="260"/>
+            <ac:grpSpMk id="98" creationId="{314866E0-C3DD-4ACD-86A9-F7400CAB233C}"/>
+          </ac:grpSpMkLst>
+        </pc:grpChg>
+        <pc:grpChg chg="mod">
+          <ac:chgData name="Ad Gerrits" userId="dea84a69e24d5d19" providerId="LiveId" clId="{F37CBAFA-4AA0-463F-B6CC-2800004C0261}" dt="2022-11-06T13:40:26.309" v="44"/>
+          <ac:grpSpMkLst>
+            <pc:docMk/>
+            <pc:sldMk cId="3740034590" sldId="260"/>
+            <ac:grpSpMk id="106" creationId="{E12A4BDB-02B3-47AC-B055-279C7D421BF0}"/>
+          </ac:grpSpMkLst>
+        </pc:grpChg>
+        <pc:grpChg chg="mod">
+          <ac:chgData name="Ad Gerrits" userId="dea84a69e24d5d19" providerId="LiveId" clId="{F37CBAFA-4AA0-463F-B6CC-2800004C0261}" dt="2022-11-06T13:40:26.309" v="44"/>
+          <ac:grpSpMkLst>
+            <pc:docMk/>
+            <pc:sldMk cId="3740034590" sldId="260"/>
+            <ac:grpSpMk id="119" creationId="{EA6BDAD1-9E04-4577-8DE0-3E49FE813ACE}"/>
+          </ac:grpSpMkLst>
+        </pc:grpChg>
+        <pc:grpChg chg="mod">
+          <ac:chgData name="Ad Gerrits" userId="dea84a69e24d5d19" providerId="LiveId" clId="{F37CBAFA-4AA0-463F-B6CC-2800004C0261}" dt="2022-11-06T13:40:26.309" v="44"/>
+          <ac:grpSpMkLst>
+            <pc:docMk/>
+            <pc:sldMk cId="3740034590" sldId="260"/>
+            <ac:grpSpMk id="128" creationId="{72B9423D-36B1-4ACD-9E06-6C811AD972D6}"/>
+          </ac:grpSpMkLst>
+        </pc:grpChg>
+        <pc:cxnChg chg="mod">
+          <ac:chgData name="Ad Gerrits" userId="dea84a69e24d5d19" providerId="LiveId" clId="{F37CBAFA-4AA0-463F-B6CC-2800004C0261}" dt="2022-11-06T13:40:26.309" v="44"/>
+          <ac:cxnSpMkLst>
+            <pc:docMk/>
+            <pc:sldMk cId="3740034590" sldId="260"/>
+            <ac:cxnSpMk id="103" creationId="{678A7669-9191-4CF9-A267-C4BBD85179D2}"/>
+          </ac:cxnSpMkLst>
+        </pc:cxnChg>
+        <pc:cxnChg chg="mod">
+          <ac:chgData name="Ad Gerrits" userId="dea84a69e24d5d19" providerId="LiveId" clId="{F37CBAFA-4AA0-463F-B6CC-2800004C0261}" dt="2022-11-06T13:40:26.309" v="44"/>
+          <ac:cxnSpMkLst>
+            <pc:docMk/>
+            <pc:sldMk cId="3740034590" sldId="260"/>
+            <ac:cxnSpMk id="104" creationId="{E7A55E62-AB3B-4882-BD0C-843A54506161}"/>
+          </ac:cxnSpMkLst>
+        </pc:cxnChg>
+        <pc:cxnChg chg="mod">
+          <ac:chgData name="Ad Gerrits" userId="dea84a69e24d5d19" providerId="LiveId" clId="{F37CBAFA-4AA0-463F-B6CC-2800004C0261}" dt="2022-11-06T13:40:26.309" v="44"/>
+          <ac:cxnSpMkLst>
+            <pc:docMk/>
+            <pc:sldMk cId="3740034590" sldId="260"/>
+            <ac:cxnSpMk id="105" creationId="{4B525D64-E96B-4DA8-8BC5-587D82F3AE31}"/>
+          </ac:cxnSpMkLst>
+        </pc:cxnChg>
+      </pc:sldChg>
+      <pc:sldChg chg="modSp">
+        <pc:chgData name="Ad Gerrits" userId="dea84a69e24d5d19" providerId="LiveId" clId="{F37CBAFA-4AA0-463F-B6CC-2800004C0261}" dt="2022-11-06T13:41:50.801" v="50"/>
+        <pc:sldMkLst>
+          <pc:docMk/>
+          <pc:sldMk cId="10477701" sldId="261"/>
+        </pc:sldMkLst>
+        <pc:spChg chg="mod">
+          <ac:chgData name="Ad Gerrits" userId="dea84a69e24d5d19" providerId="LiveId" clId="{F37CBAFA-4AA0-463F-B6CC-2800004C0261}" dt="2022-11-06T13:41:50.801" v="50"/>
+          <ac:spMkLst>
+            <pc:docMk/>
+            <pc:sldMk cId="10477701" sldId="261"/>
+            <ac:spMk id="4" creationId="{1A4A35A9-4D1E-4E1D-B073-E5AE474F0851}"/>
+          </ac:spMkLst>
+        </pc:spChg>
+        <pc:spChg chg="mod">
+          <ac:chgData name="Ad Gerrits" userId="dea84a69e24d5d19" providerId="LiveId" clId="{F37CBAFA-4AA0-463F-B6CC-2800004C0261}" dt="2022-11-06T13:41:50.801" v="50"/>
+          <ac:spMkLst>
+            <pc:docMk/>
+            <pc:sldMk cId="10477701" sldId="261"/>
+            <ac:spMk id="5" creationId="{070E618D-0574-421A-8BB6-5DCA574EE72C}"/>
+          </ac:spMkLst>
+        </pc:spChg>
+        <pc:spChg chg="mod">
+          <ac:chgData name="Ad Gerrits" userId="dea84a69e24d5d19" providerId="LiveId" clId="{F37CBAFA-4AA0-463F-B6CC-2800004C0261}" dt="2022-11-06T13:41:50.801" v="50"/>
+          <ac:spMkLst>
+            <pc:docMk/>
+            <pc:sldMk cId="10477701" sldId="261"/>
+            <ac:spMk id="6" creationId="{DB93F2A0-AEB1-4D0B-8C8A-C6BE0D96C1E1}"/>
+          </ac:spMkLst>
+        </pc:spChg>
+        <pc:grpChg chg="mod">
+          <ac:chgData name="Ad Gerrits" userId="dea84a69e24d5d19" providerId="LiveId" clId="{F37CBAFA-4AA0-463F-B6CC-2800004C0261}" dt="2022-11-06T13:41:50.801" v="50"/>
+          <ac:grpSpMkLst>
+            <pc:docMk/>
+            <pc:sldMk cId="10477701" sldId="261"/>
+            <ac:grpSpMk id="7" creationId="{60547769-F04C-4271-A7C7-49488A90F439}"/>
+          </ac:grpSpMkLst>
+        </pc:grpChg>
+        <pc:grpChg chg="mod">
+          <ac:chgData name="Ad Gerrits" userId="dea84a69e24d5d19" providerId="LiveId" clId="{F37CBAFA-4AA0-463F-B6CC-2800004C0261}" dt="2022-11-06T13:41:50.801" v="50"/>
+          <ac:grpSpMkLst>
+            <pc:docMk/>
+            <pc:sldMk cId="10477701" sldId="261"/>
+            <ac:grpSpMk id="13" creationId="{CD617942-9B45-4A9D-9FD5-024FAE72B1CF}"/>
+          </ac:grpSpMkLst>
+        </pc:grpChg>
+      </pc:sldChg>
+      <pc:sldChg chg="modSp mod">
+        <pc:chgData name="Ad Gerrits" userId="dea84a69e24d5d19" providerId="LiveId" clId="{F37CBAFA-4AA0-463F-B6CC-2800004C0261}" dt="2022-11-06T13:41:36.611" v="49" actId="14100"/>
+        <pc:sldMkLst>
+          <pc:docMk/>
+          <pc:sldMk cId="1873933419" sldId="262"/>
+        </pc:sldMkLst>
+        <pc:grpChg chg="mod">
+          <ac:chgData name="Ad Gerrits" userId="dea84a69e24d5d19" providerId="LiveId" clId="{F37CBAFA-4AA0-463F-B6CC-2800004C0261}" dt="2022-11-06T13:40:36.348" v="45"/>
+          <ac:grpSpMkLst>
+            <pc:docMk/>
+            <pc:sldMk cId="1873933419" sldId="262"/>
+            <ac:grpSpMk id="4" creationId="{6C49EACB-6976-41E4-9C0F-3EB839DC6004}"/>
+          </ac:grpSpMkLst>
+        </pc:grpChg>
+        <pc:grpChg chg="mod">
+          <ac:chgData name="Ad Gerrits" userId="dea84a69e24d5d19" providerId="LiveId" clId="{F37CBAFA-4AA0-463F-B6CC-2800004C0261}" dt="2022-11-06T13:40:36.348" v="45"/>
+          <ac:grpSpMkLst>
+            <pc:docMk/>
+            <pc:sldMk cId="1873933419" sldId="262"/>
+            <ac:grpSpMk id="7" creationId="{22F35CA7-EC2F-46F1-A82D-58081C575E47}"/>
+          </ac:grpSpMkLst>
+        </pc:grpChg>
+        <pc:grpChg chg="mod">
+          <ac:chgData name="Ad Gerrits" userId="dea84a69e24d5d19" providerId="LiveId" clId="{F37CBAFA-4AA0-463F-B6CC-2800004C0261}" dt="2022-11-06T13:40:36.348" v="45"/>
+          <ac:grpSpMkLst>
+            <pc:docMk/>
+            <pc:sldMk cId="1873933419" sldId="262"/>
+            <ac:grpSpMk id="10" creationId="{5D1AAF17-52B6-41B0-9907-4CA482BB2036}"/>
+          </ac:grpSpMkLst>
+        </pc:grpChg>
+        <pc:grpChg chg="mod">
+          <ac:chgData name="Ad Gerrits" userId="dea84a69e24d5d19" providerId="LiveId" clId="{F37CBAFA-4AA0-463F-B6CC-2800004C0261}" dt="2022-11-06T13:40:36.348" v="45"/>
+          <ac:grpSpMkLst>
+            <pc:docMk/>
+            <pc:sldMk cId="1873933419" sldId="262"/>
+            <ac:grpSpMk id="13" creationId="{EE98EFF0-BD6D-4CE6-9361-8CA016DE0779}"/>
+          </ac:grpSpMkLst>
+        </pc:grpChg>
+        <pc:grpChg chg="mod">
+          <ac:chgData name="Ad Gerrits" userId="dea84a69e24d5d19" providerId="LiveId" clId="{F37CBAFA-4AA0-463F-B6CC-2800004C0261}" dt="2022-11-06T13:40:36.348" v="45"/>
+          <ac:grpSpMkLst>
+            <pc:docMk/>
+            <pc:sldMk cId="1873933419" sldId="262"/>
+            <ac:grpSpMk id="16" creationId="{01782018-3DAA-460C-B0A1-9B812A28E793}"/>
+          </ac:grpSpMkLst>
+        </pc:grpChg>
+        <pc:grpChg chg="mod">
+          <ac:chgData name="Ad Gerrits" userId="dea84a69e24d5d19" providerId="LiveId" clId="{F37CBAFA-4AA0-463F-B6CC-2800004C0261}" dt="2022-11-06T13:41:23.952" v="47"/>
+          <ac:grpSpMkLst>
+            <pc:docMk/>
+            <pc:sldMk cId="1873933419" sldId="262"/>
+            <ac:grpSpMk id="24" creationId="{660D0592-E787-4F53-B907-470F7B2DFACF}"/>
+          </ac:grpSpMkLst>
+        </pc:grpChg>
+        <pc:grpChg chg="mod">
+          <ac:chgData name="Ad Gerrits" userId="dea84a69e24d5d19" providerId="LiveId" clId="{F37CBAFA-4AA0-463F-B6CC-2800004C0261}" dt="2022-11-06T13:41:36.611" v="49" actId="14100"/>
+          <ac:grpSpMkLst>
+            <pc:docMk/>
+            <pc:sldMk cId="1873933419" sldId="262"/>
+            <ac:grpSpMk id="27" creationId="{F8A00372-4307-4D2D-8F70-B57929A60B03}"/>
+          </ac:grpSpMkLst>
+        </pc:grpChg>
+        <pc:grpChg chg="mod">
+          <ac:chgData name="Ad Gerrits" userId="dea84a69e24d5d19" providerId="LiveId" clId="{F37CBAFA-4AA0-463F-B6CC-2800004C0261}" dt="2022-11-06T13:40:36.348" v="45"/>
+          <ac:grpSpMkLst>
+            <pc:docMk/>
+            <pc:sldMk cId="1873933419" sldId="262"/>
+            <ac:grpSpMk id="30" creationId="{025C2E9A-FD11-41F8-A062-35A2305895E8}"/>
+          </ac:grpSpMkLst>
+        </pc:grpChg>
+        <pc:cxnChg chg="mod">
+          <ac:chgData name="Ad Gerrits" userId="dea84a69e24d5d19" providerId="LiveId" clId="{F37CBAFA-4AA0-463F-B6CC-2800004C0261}" dt="2022-11-06T13:40:36.348" v="45"/>
+          <ac:cxnSpMkLst>
+            <pc:docMk/>
+            <pc:sldMk cId="1873933419" sldId="262"/>
+            <ac:cxnSpMk id="34" creationId="{E23EE97F-3498-4A66-891C-59F7B0C59906}"/>
+          </ac:cxnSpMkLst>
+        </pc:cxnChg>
+        <pc:cxnChg chg="mod">
+          <ac:chgData name="Ad Gerrits" userId="dea84a69e24d5d19" providerId="LiveId" clId="{F37CBAFA-4AA0-463F-B6CC-2800004C0261}" dt="2022-11-06T13:40:36.348" v="45"/>
+          <ac:cxnSpMkLst>
+            <pc:docMk/>
+            <pc:sldMk cId="1873933419" sldId="262"/>
+            <ac:cxnSpMk id="37" creationId="{DB0E61D5-6805-46BC-A129-A57DC9A4F1D8}"/>
+          </ac:cxnSpMkLst>
+        </pc:cxnChg>
+        <pc:cxnChg chg="mod">
+          <ac:chgData name="Ad Gerrits" userId="dea84a69e24d5d19" providerId="LiveId" clId="{F37CBAFA-4AA0-463F-B6CC-2800004C0261}" dt="2022-11-06T13:40:36.348" v="45"/>
+          <ac:cxnSpMkLst>
+            <pc:docMk/>
+            <pc:sldMk cId="1873933419" sldId="262"/>
+            <ac:cxnSpMk id="39" creationId="{86C90CCB-2BA2-451B-9C07-CCCE460B5D56}"/>
+          </ac:cxnSpMkLst>
+        </pc:cxnChg>
+        <pc:cxnChg chg="mod">
+          <ac:chgData name="Ad Gerrits" userId="dea84a69e24d5d19" providerId="LiveId" clId="{F37CBAFA-4AA0-463F-B6CC-2800004C0261}" dt="2022-11-06T13:40:36.348" v="45"/>
+          <ac:cxnSpMkLst>
+            <pc:docMk/>
+            <pc:sldMk cId="1873933419" sldId="262"/>
+            <ac:cxnSpMk id="41" creationId="{5F3968B5-2C52-472D-95A8-BEA1A2962E73}"/>
+          </ac:cxnSpMkLst>
+        </pc:cxnChg>
+        <pc:cxnChg chg="mod">
+          <ac:chgData name="Ad Gerrits" userId="dea84a69e24d5d19" providerId="LiveId" clId="{F37CBAFA-4AA0-463F-B6CC-2800004C0261}" dt="2022-11-06T13:40:36.348" v="45"/>
+          <ac:cxnSpMkLst>
+            <pc:docMk/>
+            <pc:sldMk cId="1873933419" sldId="262"/>
+            <ac:cxnSpMk id="42" creationId="{26D8C70E-BF4F-41B0-929C-3DD178680A4B}"/>
+          </ac:cxnSpMkLst>
+        </pc:cxnChg>
+        <pc:cxnChg chg="mod">
+          <ac:chgData name="Ad Gerrits" userId="dea84a69e24d5d19" providerId="LiveId" clId="{F37CBAFA-4AA0-463F-B6CC-2800004C0261}" dt="2022-11-06T13:40:36.348" v="45"/>
+          <ac:cxnSpMkLst>
+            <pc:docMk/>
+            <pc:sldMk cId="1873933419" sldId="262"/>
+            <ac:cxnSpMk id="43" creationId="{7415D802-2903-41AB-B040-3539022D869C}"/>
+          </ac:cxnSpMkLst>
+        </pc:cxnChg>
+      </pc:sldChg>
+    </pc:docChg>
+  </pc:docChgLst>
+</pc:chgInfo>
 </file>
 
 <file path=ppt/slideLayouts/slideLayout1.xml><?xml version="1.0" encoding="utf-8"?>
@@ -262,7 +1339,7 @@
           <a:p>
             <a:fld id="{5EE749AD-4813-4166-B7C0-1A2D2BD192DF}" type="datetimeFigureOut">
               <a:rPr lang="es-ES" smtClean="0"/>
-              <a:t>07/12/2018</a:t>
+              <a:t>06/11/2022</a:t>
             </a:fld>
             <a:endParaRPr lang="es-ES"/>
           </a:p>
@@ -316,7 +1393,7 @@
           <a:p>
             <a:fld id="{9FBF654F-40FD-4BE0-B7E4-9270A1E8B4BD}" type="slidenum">
               <a:rPr lang="es-ES" smtClean="0"/>
-              <a:t>‹Nr.›</a:t>
+              <a:t>‹#›</a:t>
             </a:fld>
             <a:endParaRPr lang="es-ES"/>
           </a:p>
@@ -462,7 +1539,7 @@
           <a:p>
             <a:fld id="{5EE749AD-4813-4166-B7C0-1A2D2BD192DF}" type="datetimeFigureOut">
               <a:rPr lang="es-ES" smtClean="0"/>
-              <a:t>07/12/2018</a:t>
+              <a:t>06/11/2022</a:t>
             </a:fld>
             <a:endParaRPr lang="es-ES"/>
           </a:p>
@@ -516,7 +1593,7 @@
           <a:p>
             <a:fld id="{9FBF654F-40FD-4BE0-B7E4-9270A1E8B4BD}" type="slidenum">
               <a:rPr lang="es-ES" smtClean="0"/>
-              <a:t>‹Nr.›</a:t>
+              <a:t>‹#›</a:t>
             </a:fld>
             <a:endParaRPr lang="es-ES"/>
           </a:p>
@@ -672,7 +1749,7 @@
           <a:p>
             <a:fld id="{5EE749AD-4813-4166-B7C0-1A2D2BD192DF}" type="datetimeFigureOut">
               <a:rPr lang="es-ES" smtClean="0"/>
-              <a:t>07/12/2018</a:t>
+              <a:t>06/11/2022</a:t>
             </a:fld>
             <a:endParaRPr lang="es-ES"/>
           </a:p>
@@ -726,7 +1803,7 @@
           <a:p>
             <a:fld id="{9FBF654F-40FD-4BE0-B7E4-9270A1E8B4BD}" type="slidenum">
               <a:rPr lang="es-ES" smtClean="0"/>
-              <a:t>‹Nr.›</a:t>
+              <a:t>‹#›</a:t>
             </a:fld>
             <a:endParaRPr lang="es-ES"/>
           </a:p>
@@ -872,7 +1949,7 @@
           <a:p>
             <a:fld id="{5EE749AD-4813-4166-B7C0-1A2D2BD192DF}" type="datetimeFigureOut">
               <a:rPr lang="es-ES" smtClean="0"/>
-              <a:t>07/12/2018</a:t>
+              <a:t>06/11/2022</a:t>
             </a:fld>
             <a:endParaRPr lang="es-ES"/>
           </a:p>
@@ -926,7 +2003,7 @@
           <a:p>
             <a:fld id="{9FBF654F-40FD-4BE0-B7E4-9270A1E8B4BD}" type="slidenum">
               <a:rPr lang="es-ES" smtClean="0"/>
-              <a:t>‹Nr.›</a:t>
+              <a:t>‹#›</a:t>
             </a:fld>
             <a:endParaRPr lang="es-ES"/>
           </a:p>
@@ -1148,7 +2225,7 @@
           <a:p>
             <a:fld id="{5EE749AD-4813-4166-B7C0-1A2D2BD192DF}" type="datetimeFigureOut">
               <a:rPr lang="es-ES" smtClean="0"/>
-              <a:t>07/12/2018</a:t>
+              <a:t>06/11/2022</a:t>
             </a:fld>
             <a:endParaRPr lang="es-ES"/>
           </a:p>
@@ -1202,7 +2279,7 @@
           <a:p>
             <a:fld id="{9FBF654F-40FD-4BE0-B7E4-9270A1E8B4BD}" type="slidenum">
               <a:rPr lang="es-ES" smtClean="0"/>
-              <a:t>‹Nr.›</a:t>
+              <a:t>‹#›</a:t>
             </a:fld>
             <a:endParaRPr lang="es-ES"/>
           </a:p>
@@ -1416,7 +2493,7 @@
           <a:p>
             <a:fld id="{5EE749AD-4813-4166-B7C0-1A2D2BD192DF}" type="datetimeFigureOut">
               <a:rPr lang="es-ES" smtClean="0"/>
-              <a:t>07/12/2018</a:t>
+              <a:t>06/11/2022</a:t>
             </a:fld>
             <a:endParaRPr lang="es-ES"/>
           </a:p>
@@ -1470,7 +2547,7 @@
           <a:p>
             <a:fld id="{9FBF654F-40FD-4BE0-B7E4-9270A1E8B4BD}" type="slidenum">
               <a:rPr lang="es-ES" smtClean="0"/>
-              <a:t>‹Nr.›</a:t>
+              <a:t>‹#›</a:t>
             </a:fld>
             <a:endParaRPr lang="es-ES"/>
           </a:p>
@@ -1831,7 +2908,7 @@
           <a:p>
             <a:fld id="{5EE749AD-4813-4166-B7C0-1A2D2BD192DF}" type="datetimeFigureOut">
               <a:rPr lang="es-ES" smtClean="0"/>
-              <a:t>07/12/2018</a:t>
+              <a:t>06/11/2022</a:t>
             </a:fld>
             <a:endParaRPr lang="es-ES"/>
           </a:p>
@@ -1885,7 +2962,7 @@
           <a:p>
             <a:fld id="{9FBF654F-40FD-4BE0-B7E4-9270A1E8B4BD}" type="slidenum">
               <a:rPr lang="es-ES" smtClean="0"/>
-              <a:t>‹Nr.›</a:t>
+              <a:t>‹#›</a:t>
             </a:fld>
             <a:endParaRPr lang="es-ES"/>
           </a:p>
@@ -1973,7 +3050,7 @@
           <a:p>
             <a:fld id="{5EE749AD-4813-4166-B7C0-1A2D2BD192DF}" type="datetimeFigureOut">
               <a:rPr lang="es-ES" smtClean="0"/>
-              <a:t>07/12/2018</a:t>
+              <a:t>06/11/2022</a:t>
             </a:fld>
             <a:endParaRPr lang="es-ES"/>
           </a:p>
@@ -2027,7 +3104,7 @@
           <a:p>
             <a:fld id="{9FBF654F-40FD-4BE0-B7E4-9270A1E8B4BD}" type="slidenum">
               <a:rPr lang="es-ES" smtClean="0"/>
-              <a:t>‹Nr.›</a:t>
+              <a:t>‹#›</a:t>
             </a:fld>
             <a:endParaRPr lang="es-ES"/>
           </a:p>
@@ -2086,7 +3163,7 @@
           <a:p>
             <a:fld id="{5EE749AD-4813-4166-B7C0-1A2D2BD192DF}" type="datetimeFigureOut">
               <a:rPr lang="es-ES" smtClean="0"/>
-              <a:t>07/12/2018</a:t>
+              <a:t>06/11/2022</a:t>
             </a:fld>
             <a:endParaRPr lang="es-ES"/>
           </a:p>
@@ -2140,7 +3217,7 @@
           <a:p>
             <a:fld id="{9FBF654F-40FD-4BE0-B7E4-9270A1E8B4BD}" type="slidenum">
               <a:rPr lang="es-ES" smtClean="0"/>
-              <a:t>‹Nr.›</a:t>
+              <a:t>‹#›</a:t>
             </a:fld>
             <a:endParaRPr lang="es-ES"/>
           </a:p>
@@ -2399,7 +3476,7 @@
           <a:p>
             <a:fld id="{5EE749AD-4813-4166-B7C0-1A2D2BD192DF}" type="datetimeFigureOut">
               <a:rPr lang="es-ES" smtClean="0"/>
-              <a:t>07/12/2018</a:t>
+              <a:t>06/11/2022</a:t>
             </a:fld>
             <a:endParaRPr lang="es-ES"/>
           </a:p>
@@ -2453,7 +3530,7 @@
           <a:p>
             <a:fld id="{9FBF654F-40FD-4BE0-B7E4-9270A1E8B4BD}" type="slidenum">
               <a:rPr lang="es-ES" smtClean="0"/>
-              <a:t>‹Nr.›</a:t>
+              <a:t>‹#›</a:t>
             </a:fld>
             <a:endParaRPr lang="es-ES"/>
           </a:p>
@@ -2688,7 +3765,7 @@
           <a:p>
             <a:fld id="{5EE749AD-4813-4166-B7C0-1A2D2BD192DF}" type="datetimeFigureOut">
               <a:rPr lang="es-ES" smtClean="0"/>
-              <a:t>07/12/2018</a:t>
+              <a:t>06/11/2022</a:t>
             </a:fld>
             <a:endParaRPr lang="es-ES"/>
           </a:p>
@@ -2742,7 +3819,7 @@
           <a:p>
             <a:fld id="{9FBF654F-40FD-4BE0-B7E4-9270A1E8B4BD}" type="slidenum">
               <a:rPr lang="es-ES" smtClean="0"/>
-              <a:t>‹Nr.›</a:t>
+              <a:t>‹#›</a:t>
             </a:fld>
             <a:endParaRPr lang="es-ES"/>
           </a:p>
@@ -2931,7 +4008,7 @@
           <a:p>
             <a:fld id="{5EE749AD-4813-4166-B7C0-1A2D2BD192DF}" type="datetimeFigureOut">
               <a:rPr lang="es-ES" smtClean="0"/>
-              <a:t>07/12/2018</a:t>
+              <a:t>06/11/2022</a:t>
             </a:fld>
             <a:endParaRPr lang="es-ES"/>
           </a:p>
@@ -3021,7 +4098,7 @@
           <a:p>
             <a:fld id="{9FBF654F-40FD-4BE0-B7E4-9270A1E8B4BD}" type="slidenum">
               <a:rPr lang="es-ES" smtClean="0"/>
-              <a:t>‹Nr.›</a:t>
+              <a:t>‹#›</a:t>
             </a:fld>
             <a:endParaRPr lang="es-ES"/>
           </a:p>
@@ -3514,7 +4591,9 @@
               </a:ext>
             </a:extLst>
           </p:cNvPr>
-          <p:cNvSpPr/>
+          <p:cNvSpPr>
+            <a:spLocks noChangeAspect="1"/>
+          </p:cNvSpPr>
           <p:nvPr/>
         </p:nvSpPr>
         <p:spPr>
@@ -3564,7 +4643,9 @@
               </a:ext>
             </a:extLst>
           </p:cNvPr>
-          <p:cNvGrpSpPr/>
+          <p:cNvGrpSpPr>
+            <a:grpSpLocks noChangeAspect="1"/>
+          </p:cNvGrpSpPr>
           <p:nvPr/>
         </p:nvGrpSpPr>
         <p:grpSpPr>
@@ -3685,7 +4766,9 @@
               </a:ext>
             </a:extLst>
           </p:cNvPr>
-          <p:cNvSpPr/>
+          <p:cNvSpPr>
+            <a:spLocks noChangeAspect="1"/>
+          </p:cNvSpPr>
           <p:nvPr/>
         </p:nvSpPr>
         <p:spPr>
@@ -3735,7 +4818,9 @@
               </a:ext>
             </a:extLst>
           </p:cNvPr>
-          <p:cNvSpPr/>
+          <p:cNvSpPr>
+            <a:spLocks noChangeAspect="1"/>
+          </p:cNvSpPr>
           <p:nvPr/>
         </p:nvSpPr>
         <p:spPr>
@@ -3789,7 +4874,9 @@
               </a:ext>
             </a:extLst>
           </p:cNvPr>
-          <p:cNvSpPr/>
+          <p:cNvSpPr>
+            <a:spLocks noChangeAspect="1"/>
+          </p:cNvSpPr>
           <p:nvPr/>
         </p:nvSpPr>
         <p:spPr>
@@ -3843,7 +4930,9 @@
               </a:ext>
             </a:extLst>
           </p:cNvPr>
-          <p:cNvGrpSpPr/>
+          <p:cNvGrpSpPr>
+            <a:grpSpLocks noChangeAspect="1"/>
+          </p:cNvGrpSpPr>
           <p:nvPr/>
         </p:nvGrpSpPr>
         <p:grpSpPr>
@@ -4429,7 +5518,9 @@
               </a:ext>
             </a:extLst>
           </p:cNvPr>
-          <p:cNvGrpSpPr/>
+          <p:cNvGrpSpPr>
+            <a:grpSpLocks noChangeAspect="1"/>
+          </p:cNvGrpSpPr>
           <p:nvPr/>
         </p:nvGrpSpPr>
         <p:grpSpPr>
@@ -4944,7 +6035,9 @@
               </a:ext>
             </a:extLst>
           </p:cNvPr>
-          <p:cNvGrpSpPr/>
+          <p:cNvGrpSpPr>
+            <a:grpSpLocks noChangeAspect="1"/>
+          </p:cNvGrpSpPr>
           <p:nvPr/>
         </p:nvGrpSpPr>
         <p:grpSpPr>
@@ -5422,7 +6515,9 @@
               </a:ext>
             </a:extLst>
           </p:cNvPr>
-          <p:cNvGrpSpPr/>
+          <p:cNvGrpSpPr>
+            <a:grpSpLocks noChangeAspect="1"/>
+          </p:cNvGrpSpPr>
           <p:nvPr/>
         </p:nvGrpSpPr>
         <p:grpSpPr>
@@ -6436,7 +7531,9 @@
               </a:ext>
             </a:extLst>
           </p:cNvPr>
-          <p:cNvGrpSpPr/>
+          <p:cNvGrpSpPr>
+            <a:grpSpLocks noChangeAspect="1"/>
+          </p:cNvGrpSpPr>
           <p:nvPr/>
         </p:nvGrpSpPr>
         <p:grpSpPr>
@@ -6607,7 +7704,9 @@
               </a:ext>
             </a:extLst>
           </p:cNvPr>
-          <p:cNvGrpSpPr/>
+          <p:cNvGrpSpPr>
+            <a:grpSpLocks noChangeAspect="1"/>
+          </p:cNvGrpSpPr>
           <p:nvPr/>
         </p:nvGrpSpPr>
         <p:grpSpPr>
@@ -7314,7 +8413,9 @@
               </a:ext>
             </a:extLst>
           </p:cNvPr>
-          <p:cNvGrpSpPr/>
+          <p:cNvGrpSpPr>
+            <a:grpSpLocks noChangeAspect="1"/>
+          </p:cNvGrpSpPr>
           <p:nvPr/>
         </p:nvGrpSpPr>
         <p:grpSpPr>
@@ -7964,7 +9065,9 @@
               </a:ext>
             </a:extLst>
           </p:cNvPr>
-          <p:cNvGrpSpPr/>
+          <p:cNvGrpSpPr>
+            <a:grpSpLocks noChangeAspect="1"/>
+          </p:cNvGrpSpPr>
           <p:nvPr/>
         </p:nvGrpSpPr>
         <p:grpSpPr>
@@ -8078,13 +9181,15 @@
               </a:ext>
             </a:extLst>
           </p:cNvPr>
-          <p:cNvGrpSpPr/>
+          <p:cNvGrpSpPr>
+            <a:grpSpLocks noChangeAspect="1"/>
+          </p:cNvGrpSpPr>
           <p:nvPr/>
         </p:nvGrpSpPr>
         <p:grpSpPr>
           <a:xfrm>
             <a:off x="843666" y="4786894"/>
-            <a:ext cx="1539661" cy="914080"/>
+            <a:ext cx="1555636" cy="923564"/>
             <a:chOff x="5093195" y="4221882"/>
             <a:chExt cx="1539661" cy="914080"/>
           </a:xfrm>
@@ -8664,7 +9769,9 @@
               </a:ext>
             </a:extLst>
           </p:cNvPr>
-          <p:cNvGrpSpPr/>
+          <p:cNvGrpSpPr>
+            <a:grpSpLocks noChangeAspect="1"/>
+          </p:cNvGrpSpPr>
           <p:nvPr/>
         </p:nvGrpSpPr>
         <p:grpSpPr>
@@ -9321,7 +10428,9 @@
               </a:ext>
             </a:extLst>
           </p:cNvPr>
-          <p:cNvSpPr/>
+          <p:cNvSpPr>
+            <a:spLocks noChangeAspect="1"/>
+          </p:cNvSpPr>
           <p:nvPr/>
         </p:nvSpPr>
         <p:spPr>
@@ -9375,7 +10484,9 @@
               </a:ext>
             </a:extLst>
           </p:cNvPr>
-          <p:cNvGrpSpPr/>
+          <p:cNvGrpSpPr>
+            <a:grpSpLocks noChangeAspect="1"/>
+          </p:cNvGrpSpPr>
           <p:nvPr/>
         </p:nvGrpSpPr>
         <p:grpSpPr>
@@ -9965,7 +11076,9 @@
               </a:ext>
             </a:extLst>
           </p:cNvPr>
-          <p:cNvGrpSpPr/>
+          <p:cNvGrpSpPr>
+            <a:grpSpLocks noChangeAspect="1"/>
+          </p:cNvGrpSpPr>
           <p:nvPr/>
         </p:nvGrpSpPr>
         <p:grpSpPr>
@@ -10338,7 +11451,9 @@
               </a:ext>
             </a:extLst>
           </p:cNvPr>
-          <p:cNvGrpSpPr/>
+          <p:cNvGrpSpPr>
+            <a:grpSpLocks noChangeAspect="1"/>
+          </p:cNvGrpSpPr>
           <p:nvPr/>
         </p:nvGrpSpPr>
         <p:grpSpPr>
@@ -10776,7 +11891,9 @@
               </a:ext>
             </a:extLst>
           </p:cNvPr>
-          <p:cNvGrpSpPr/>
+          <p:cNvGrpSpPr>
+            <a:grpSpLocks noChangeAspect="1"/>
+          </p:cNvGrpSpPr>
           <p:nvPr/>
         </p:nvGrpSpPr>
         <p:grpSpPr>
@@ -10896,7 +12013,9 @@
               </a:ext>
             </a:extLst>
           </p:cNvPr>
-          <p:cNvGrpSpPr/>
+          <p:cNvGrpSpPr>
+            <a:grpSpLocks noChangeAspect="1"/>
+          </p:cNvGrpSpPr>
           <p:nvPr/>
         </p:nvGrpSpPr>
         <p:grpSpPr>
@@ -11074,7 +12193,9 @@
               </a:ext>
             </a:extLst>
           </p:cNvPr>
-          <p:cNvGrpSpPr/>
+          <p:cNvGrpSpPr>
+            <a:grpSpLocks noChangeAspect="1"/>
+          </p:cNvGrpSpPr>
           <p:nvPr/>
         </p:nvGrpSpPr>
         <p:grpSpPr>
@@ -11190,7 +12311,9 @@
               </a:ext>
             </a:extLst>
           </p:cNvPr>
-          <p:cNvGrpSpPr/>
+          <p:cNvGrpSpPr>
+            <a:grpSpLocks noChangeAspect="1"/>
+          </p:cNvGrpSpPr>
           <p:nvPr/>
         </p:nvGrpSpPr>
         <p:grpSpPr>
@@ -11315,7 +12438,9 @@
               </a:ext>
             </a:extLst>
           </p:cNvPr>
-          <p:cNvSpPr/>
+          <p:cNvSpPr>
+            <a:spLocks noChangeAspect="1"/>
+          </p:cNvSpPr>
           <p:nvPr/>
         </p:nvSpPr>
         <p:spPr>
@@ -11365,7 +12490,9 @@
               </a:ext>
             </a:extLst>
           </p:cNvPr>
-          <p:cNvGrpSpPr/>
+          <p:cNvGrpSpPr>
+            <a:grpSpLocks noChangeAspect="1"/>
+          </p:cNvGrpSpPr>
           <p:nvPr/>
         </p:nvGrpSpPr>
         <p:grpSpPr>
@@ -11494,7 +12621,9 @@
               </a:ext>
             </a:extLst>
           </p:cNvPr>
-          <p:cNvGrpSpPr/>
+          <p:cNvGrpSpPr>
+            <a:grpSpLocks noChangeAspect="1"/>
+          </p:cNvGrpSpPr>
           <p:nvPr/>
         </p:nvGrpSpPr>
         <p:grpSpPr>
@@ -11729,7 +12858,9 @@
               </a:ext>
             </a:extLst>
           </p:cNvPr>
-          <p:cNvGrpSpPr/>
+          <p:cNvGrpSpPr>
+            <a:grpSpLocks noChangeAspect="1"/>
+          </p:cNvGrpSpPr>
           <p:nvPr/>
         </p:nvGrpSpPr>
         <p:grpSpPr>
@@ -12043,7 +13174,9 @@
               </a:ext>
             </a:extLst>
           </p:cNvPr>
-          <p:cNvGrpSpPr/>
+          <p:cNvGrpSpPr>
+            <a:grpSpLocks noChangeAspect="1"/>
+          </p:cNvGrpSpPr>
           <p:nvPr/>
         </p:nvGrpSpPr>
         <p:grpSpPr>
@@ -12233,7 +13366,9 @@
               </a:ext>
             </a:extLst>
           </p:cNvPr>
-          <p:cNvGrpSpPr/>
+          <p:cNvGrpSpPr>
+            <a:grpSpLocks noChangeAspect="1"/>
+          </p:cNvGrpSpPr>
           <p:nvPr/>
         </p:nvGrpSpPr>
         <p:grpSpPr>
@@ -12502,7 +13637,9 @@
               </a:ext>
             </a:extLst>
           </p:cNvPr>
-          <p:cNvGrpSpPr/>
+          <p:cNvGrpSpPr>
+            <a:grpSpLocks noChangeAspect="1"/>
+          </p:cNvGrpSpPr>
           <p:nvPr/>
         </p:nvGrpSpPr>
         <p:grpSpPr>
@@ -12612,7 +13749,9 @@
               </a:ext>
             </a:extLst>
           </p:cNvPr>
-          <p:cNvSpPr/>
+          <p:cNvSpPr>
+            <a:spLocks noChangeAspect="1"/>
+          </p:cNvSpPr>
           <p:nvPr/>
         </p:nvSpPr>
         <p:spPr>
@@ -12662,7 +13801,9 @@
               </a:ext>
             </a:extLst>
           </p:cNvPr>
-          <p:cNvGrpSpPr/>
+          <p:cNvGrpSpPr>
+            <a:grpSpLocks noChangeAspect="1"/>
+          </p:cNvGrpSpPr>
           <p:nvPr/>
         </p:nvGrpSpPr>
         <p:grpSpPr>
@@ -12851,7 +13992,9 @@
               </a:ext>
             </a:extLst>
           </p:cNvPr>
-          <p:cNvGrpSpPr/>
+          <p:cNvGrpSpPr>
+            <a:grpSpLocks noChangeAspect="1"/>
+          </p:cNvGrpSpPr>
           <p:nvPr/>
         </p:nvGrpSpPr>
         <p:grpSpPr>
@@ -12980,7 +14123,9 @@
               </a:ext>
             </a:extLst>
           </p:cNvPr>
-          <p:cNvSpPr/>
+          <p:cNvSpPr>
+            <a:spLocks noChangeAspect="1"/>
+          </p:cNvSpPr>
           <p:nvPr/>
         </p:nvSpPr>
         <p:spPr>
@@ -13030,7 +14175,9 @@
               </a:ext>
             </a:extLst>
           </p:cNvPr>
-          <p:cNvGrpSpPr/>
+          <p:cNvGrpSpPr>
+            <a:grpSpLocks noChangeAspect="1"/>
+          </p:cNvGrpSpPr>
           <p:nvPr/>
         </p:nvGrpSpPr>
         <p:grpSpPr>
@@ -13159,7 +14306,9 @@
               </a:ext>
             </a:extLst>
           </p:cNvPr>
-          <p:cNvGrpSpPr/>
+          <p:cNvGrpSpPr>
+            <a:grpSpLocks noChangeAspect="1"/>
+          </p:cNvGrpSpPr>
           <p:nvPr/>
         </p:nvGrpSpPr>
         <p:grpSpPr>
@@ -13399,7 +14548,9 @@
               </a:ext>
             </a:extLst>
           </p:cNvPr>
-          <p:cNvGrpSpPr/>
+          <p:cNvGrpSpPr>
+            <a:grpSpLocks noChangeAspect="1"/>
+          </p:cNvGrpSpPr>
           <p:nvPr/>
         </p:nvGrpSpPr>
         <p:grpSpPr>
@@ -13718,7 +14869,9 @@
               </a:ext>
             </a:extLst>
           </p:cNvPr>
-          <p:cNvGrpSpPr/>
+          <p:cNvGrpSpPr>
+            <a:grpSpLocks noChangeAspect="1"/>
+          </p:cNvGrpSpPr>
           <p:nvPr/>
         </p:nvGrpSpPr>
         <p:grpSpPr>
@@ -13992,7 +15145,9 @@
               </a:ext>
             </a:extLst>
           </p:cNvPr>
-          <p:cNvGrpSpPr/>
+          <p:cNvGrpSpPr>
+            <a:grpSpLocks noChangeAspect="1"/>
+          </p:cNvGrpSpPr>
           <p:nvPr/>
         </p:nvGrpSpPr>
         <p:grpSpPr>
@@ -14345,7 +15500,9 @@
               </a:ext>
             </a:extLst>
           </p:cNvPr>
-          <p:cNvGrpSpPr/>
+          <p:cNvGrpSpPr>
+            <a:grpSpLocks noChangeAspect="1"/>
+          </p:cNvGrpSpPr>
           <p:nvPr/>
         </p:nvGrpSpPr>
         <p:grpSpPr>
@@ -14585,7 +15742,9 @@
               </a:ext>
             </a:extLst>
           </p:cNvPr>
-          <p:cNvGrpSpPr/>
+          <p:cNvGrpSpPr>
+            <a:grpSpLocks noChangeAspect="1"/>
+          </p:cNvGrpSpPr>
           <p:nvPr/>
         </p:nvGrpSpPr>
         <p:grpSpPr>
@@ -14963,7 +16122,9 @@
               </a:ext>
             </a:extLst>
           </p:cNvPr>
-          <p:cNvGrpSpPr/>
+          <p:cNvGrpSpPr>
+            <a:grpSpLocks noChangeAspect="1"/>
+          </p:cNvGrpSpPr>
           <p:nvPr/>
         </p:nvGrpSpPr>
         <p:grpSpPr>
@@ -15085,7 +16246,9 @@
               </a:ext>
             </a:extLst>
           </p:cNvPr>
-          <p:cNvGrpSpPr/>
+          <p:cNvGrpSpPr>
+            <a:grpSpLocks noChangeAspect="1"/>
+          </p:cNvGrpSpPr>
           <p:nvPr/>
         </p:nvGrpSpPr>
         <p:grpSpPr>
@@ -15195,7 +16358,9 @@
               </a:ext>
             </a:extLst>
           </p:cNvPr>
-          <p:cNvSpPr/>
+          <p:cNvSpPr>
+            <a:spLocks noChangeAspect="1"/>
+          </p:cNvSpPr>
           <p:nvPr/>
         </p:nvSpPr>
         <p:spPr>
@@ -15245,7 +16410,9 @@
               </a:ext>
             </a:extLst>
           </p:cNvPr>
-          <p:cNvGrpSpPr/>
+          <p:cNvGrpSpPr>
+            <a:grpSpLocks noChangeAspect="1"/>
+          </p:cNvGrpSpPr>
           <p:nvPr/>
         </p:nvGrpSpPr>
         <p:grpSpPr>
@@ -15440,7 +16607,9 @@
               </a:ext>
             </a:extLst>
           </p:cNvPr>
-          <p:cNvGrpSpPr/>
+          <p:cNvGrpSpPr>
+            <a:grpSpLocks noChangeAspect="1"/>
+          </p:cNvGrpSpPr>
           <p:nvPr/>
         </p:nvGrpSpPr>
         <p:grpSpPr>
@@ -15572,7 +16741,9 @@
               </a:ext>
             </a:extLst>
           </p:cNvPr>
-          <p:cNvSpPr/>
+          <p:cNvSpPr>
+            <a:spLocks noChangeAspect="1"/>
+          </p:cNvSpPr>
           <p:nvPr/>
         </p:nvSpPr>
         <p:spPr>
@@ -15622,7 +16793,9 @@
               </a:ext>
             </a:extLst>
           </p:cNvPr>
-          <p:cNvGrpSpPr/>
+          <p:cNvGrpSpPr>
+            <a:grpSpLocks noChangeAspect="1"/>
+          </p:cNvGrpSpPr>
           <p:nvPr/>
         </p:nvGrpSpPr>
         <p:grpSpPr>
@@ -15754,7 +16927,9 @@
               </a:ext>
             </a:extLst>
           </p:cNvPr>
-          <p:cNvGrpSpPr/>
+          <p:cNvGrpSpPr>
+            <a:grpSpLocks noChangeAspect="1"/>
+          </p:cNvGrpSpPr>
           <p:nvPr/>
         </p:nvGrpSpPr>
         <p:grpSpPr>
@@ -15990,7 +17165,9 @@
               </a:ext>
             </a:extLst>
           </p:cNvPr>
-          <p:cNvGrpSpPr/>
+          <p:cNvGrpSpPr>
+            <a:grpSpLocks noChangeAspect="1"/>
+          </p:cNvGrpSpPr>
           <p:nvPr/>
         </p:nvGrpSpPr>
         <p:grpSpPr>
@@ -16308,7 +17485,9 @@
               </a:ext>
             </a:extLst>
           </p:cNvPr>
-          <p:cNvGrpSpPr/>
+          <p:cNvGrpSpPr>
+            <a:grpSpLocks noChangeAspect="1"/>
+          </p:cNvGrpSpPr>
           <p:nvPr/>
         </p:nvGrpSpPr>
         <p:grpSpPr>
@@ -16498,7 +17677,9 @@
               </a:ext>
             </a:extLst>
           </p:cNvPr>
-          <p:cNvGrpSpPr/>
+          <p:cNvGrpSpPr>
+            <a:grpSpLocks noChangeAspect="1"/>
+          </p:cNvGrpSpPr>
           <p:nvPr/>
         </p:nvGrpSpPr>
         <p:grpSpPr>
@@ -16771,7 +17952,9 @@
               </a:ext>
             </a:extLst>
           </p:cNvPr>
-          <p:cNvGrpSpPr/>
+          <p:cNvGrpSpPr>
+            <a:grpSpLocks noChangeAspect="1"/>
+          </p:cNvGrpSpPr>
           <p:nvPr/>
         </p:nvGrpSpPr>
         <p:grpSpPr>
@@ -17007,7 +18190,9 @@
               </a:ext>
             </a:extLst>
           </p:cNvPr>
-          <p:cNvGrpSpPr/>
+          <p:cNvGrpSpPr>
+            <a:grpSpLocks noChangeAspect="1"/>
+          </p:cNvGrpSpPr>
           <p:nvPr/>
         </p:nvGrpSpPr>
         <p:grpSpPr>
@@ -17325,7 +18510,9 @@
               </a:ext>
             </a:extLst>
           </p:cNvPr>
-          <p:cNvGrpSpPr/>
+          <p:cNvGrpSpPr>
+            <a:grpSpLocks noChangeAspect="1"/>
+          </p:cNvGrpSpPr>
           <p:nvPr/>
         </p:nvGrpSpPr>
         <p:grpSpPr>
@@ -17599,7 +18786,9 @@
               </a:ext>
             </a:extLst>
           </p:cNvPr>
-          <p:cNvGrpSpPr/>
+          <p:cNvGrpSpPr>
+            <a:grpSpLocks noChangeAspect="1"/>
+          </p:cNvGrpSpPr>
           <p:nvPr/>
         </p:nvGrpSpPr>
         <p:grpSpPr>
@@ -17955,7 +19144,9 @@
               </a:ext>
             </a:extLst>
           </p:cNvPr>
-          <p:cNvGrpSpPr/>
+          <p:cNvGrpSpPr>
+            <a:grpSpLocks noChangeAspect="1"/>
+          </p:cNvGrpSpPr>
           <p:nvPr/>
         </p:nvGrpSpPr>
         <p:grpSpPr>
@@ -18126,7 +19317,9 @@
               </a:ext>
             </a:extLst>
           </p:cNvPr>
-          <p:cNvGrpSpPr/>
+          <p:cNvGrpSpPr>
+            <a:grpSpLocks noChangeAspect="1"/>
+          </p:cNvGrpSpPr>
           <p:nvPr/>
         </p:nvGrpSpPr>
         <p:grpSpPr>
@@ -18439,7 +19632,9 @@
               </a:ext>
             </a:extLst>
           </p:cNvPr>
-          <p:cNvGrpSpPr/>
+          <p:cNvGrpSpPr>
+            <a:grpSpLocks noChangeAspect="1"/>
+          </p:cNvGrpSpPr>
           <p:nvPr/>
         </p:nvGrpSpPr>
         <p:grpSpPr>
@@ -18553,7 +19748,9 @@
               </a:ext>
             </a:extLst>
           </p:cNvPr>
-          <p:cNvSpPr/>
+          <p:cNvSpPr>
+            <a:spLocks noChangeAspect="1"/>
+          </p:cNvSpPr>
           <p:nvPr/>
         </p:nvSpPr>
         <p:spPr>
@@ -18603,7 +19800,9 @@
               </a:ext>
             </a:extLst>
           </p:cNvPr>
-          <p:cNvGrpSpPr/>
+          <p:cNvGrpSpPr>
+            <a:grpSpLocks noChangeAspect="1"/>
+          </p:cNvGrpSpPr>
           <p:nvPr/>
         </p:nvGrpSpPr>
         <p:grpSpPr>
@@ -18795,7 +19994,9 @@
               </a:ext>
             </a:extLst>
           </p:cNvPr>
-          <p:cNvGrpSpPr/>
+          <p:cNvGrpSpPr>
+            <a:grpSpLocks noChangeAspect="1"/>
+          </p:cNvGrpSpPr>
           <p:nvPr/>
         </p:nvGrpSpPr>
         <p:grpSpPr>
@@ -18923,7 +20124,9 @@
               </a:ext>
             </a:extLst>
           </p:cNvPr>
-          <p:cNvSpPr/>
+          <p:cNvSpPr>
+            <a:spLocks noChangeAspect="1"/>
+          </p:cNvSpPr>
           <p:nvPr/>
         </p:nvSpPr>
         <p:spPr>
@@ -18973,7 +20176,9 @@
               </a:ext>
             </a:extLst>
           </p:cNvPr>
-          <p:cNvGrpSpPr/>
+          <p:cNvGrpSpPr>
+            <a:grpSpLocks noChangeAspect="1"/>
+          </p:cNvGrpSpPr>
           <p:nvPr/>
         </p:nvGrpSpPr>
         <p:grpSpPr>
@@ -19101,7 +20306,9 @@
               </a:ext>
             </a:extLst>
           </p:cNvPr>
-          <p:cNvGrpSpPr/>
+          <p:cNvGrpSpPr>
+            <a:grpSpLocks noChangeAspect="1"/>
+          </p:cNvGrpSpPr>
           <p:nvPr/>
         </p:nvGrpSpPr>
         <p:grpSpPr>
@@ -19291,7 +20498,9 @@
               </a:ext>
             </a:extLst>
           </p:cNvPr>
-          <p:cNvGrpSpPr/>
+          <p:cNvGrpSpPr>
+            <a:grpSpLocks noChangeAspect="1"/>
+          </p:cNvGrpSpPr>
           <p:nvPr/>
         </p:nvGrpSpPr>
         <p:grpSpPr>
@@ -19559,7 +20768,9 @@
               </a:ext>
             </a:extLst>
           </p:cNvPr>
-          <p:cNvGrpSpPr/>
+          <p:cNvGrpSpPr>
+            <a:grpSpLocks noChangeAspect="1"/>
+          </p:cNvGrpSpPr>
           <p:nvPr/>
         </p:nvGrpSpPr>
         <p:grpSpPr>
@@ -19795,7 +21006,9 @@
               </a:ext>
             </a:extLst>
           </p:cNvPr>
-          <p:cNvGrpSpPr/>
+          <p:cNvGrpSpPr>
+            <a:grpSpLocks noChangeAspect="1"/>
+          </p:cNvGrpSpPr>
           <p:nvPr/>
         </p:nvGrpSpPr>
         <p:grpSpPr>
@@ -20109,7 +21322,9 @@
               </a:ext>
             </a:extLst>
           </p:cNvPr>
-          <p:cNvGrpSpPr/>
+          <p:cNvGrpSpPr>
+            <a:grpSpLocks noChangeAspect="1"/>
+          </p:cNvGrpSpPr>
           <p:nvPr/>
         </p:nvGrpSpPr>
         <p:grpSpPr>
@@ -20383,7 +21598,9 @@
               </a:ext>
             </a:extLst>
           </p:cNvPr>
-          <p:cNvGrpSpPr/>
+          <p:cNvGrpSpPr>
+            <a:grpSpLocks noChangeAspect="1"/>
+          </p:cNvGrpSpPr>
           <p:nvPr/>
         </p:nvGrpSpPr>
         <p:grpSpPr>
@@ -20735,7 +21952,9 @@
               </a:ext>
             </a:extLst>
           </p:cNvPr>
-          <p:cNvGrpSpPr/>
+          <p:cNvGrpSpPr>
+            <a:grpSpLocks noChangeAspect="1"/>
+          </p:cNvGrpSpPr>
           <p:nvPr/>
         </p:nvGrpSpPr>
         <p:grpSpPr>
@@ -20971,7 +22190,9 @@
               </a:ext>
             </a:extLst>
           </p:cNvPr>
-          <p:cNvGrpSpPr/>
+          <p:cNvGrpSpPr>
+            <a:grpSpLocks noChangeAspect="1"/>
+          </p:cNvGrpSpPr>
           <p:nvPr/>
         </p:nvGrpSpPr>
         <p:grpSpPr>
@@ -21285,7 +22506,9 @@
               </a:ext>
             </a:extLst>
           </p:cNvPr>
-          <p:cNvSpPr/>
+          <p:cNvSpPr>
+            <a:spLocks noChangeAspect="1"/>
+          </p:cNvSpPr>
           <p:nvPr/>
         </p:nvSpPr>
         <p:spPr>
@@ -21339,7 +22562,9 @@
               </a:ext>
             </a:extLst>
           </p:cNvPr>
-          <p:cNvSpPr/>
+          <p:cNvSpPr>
+            <a:spLocks noChangeAspect="1"/>
+          </p:cNvSpPr>
           <p:nvPr/>
         </p:nvSpPr>
         <p:spPr>
@@ -21389,7 +22614,9 @@
               </a:ext>
             </a:extLst>
           </p:cNvPr>
-          <p:cNvSpPr/>
+          <p:cNvSpPr>
+            <a:spLocks noChangeAspect="1"/>
+          </p:cNvSpPr>
           <p:nvPr/>
         </p:nvSpPr>
         <p:spPr>
@@ -21439,7 +22666,9 @@
               </a:ext>
             </a:extLst>
           </p:cNvPr>
-          <p:cNvSpPr/>
+          <p:cNvSpPr>
+            <a:spLocks noChangeAspect="1"/>
+          </p:cNvSpPr>
           <p:nvPr/>
         </p:nvSpPr>
         <p:spPr>
@@ -21493,7 +22722,9 @@
               </a:ext>
             </a:extLst>
           </p:cNvPr>
-          <p:cNvGrpSpPr/>
+          <p:cNvGrpSpPr>
+            <a:grpSpLocks noChangeAspect="1"/>
+          </p:cNvGrpSpPr>
           <p:nvPr/>
         </p:nvGrpSpPr>
         <p:grpSpPr>
@@ -21726,7 +22957,9 @@
               </a:ext>
             </a:extLst>
           </p:cNvPr>
-          <p:cNvGrpSpPr/>
+          <p:cNvGrpSpPr>
+            <a:grpSpLocks noChangeAspect="1"/>
+          </p:cNvGrpSpPr>
           <p:nvPr/>
         </p:nvGrpSpPr>
         <p:grpSpPr>
@@ -21957,7 +23190,9 @@
               </a:ext>
             </a:extLst>
           </p:cNvPr>
-          <p:cNvGrpSpPr/>
+          <p:cNvGrpSpPr>
+            <a:grpSpLocks noChangeAspect="1"/>
+          </p:cNvGrpSpPr>
           <p:nvPr/>
         </p:nvGrpSpPr>
         <p:grpSpPr>
@@ -22125,7 +23360,9 @@
               </a:ext>
             </a:extLst>
           </p:cNvPr>
-          <p:cNvSpPr/>
+          <p:cNvSpPr>
+            <a:spLocks noChangeAspect="1"/>
+          </p:cNvSpPr>
           <p:nvPr/>
         </p:nvSpPr>
         <p:spPr>
@@ -22183,7 +23420,9 @@
               </a:ext>
             </a:extLst>
           </p:cNvPr>
-          <p:cNvGrpSpPr/>
+          <p:cNvGrpSpPr>
+            <a:grpSpLocks noChangeAspect="1"/>
+          </p:cNvGrpSpPr>
           <p:nvPr/>
         </p:nvGrpSpPr>
         <p:grpSpPr>
@@ -22351,7 +23590,9 @@
               </a:ext>
             </a:extLst>
           </p:cNvPr>
-          <p:cNvSpPr/>
+          <p:cNvSpPr>
+            <a:spLocks noChangeAspect="1"/>
+          </p:cNvSpPr>
           <p:nvPr/>
         </p:nvSpPr>
         <p:spPr>
@@ -22405,7 +23646,9 @@
               </a:ext>
             </a:extLst>
           </p:cNvPr>
-          <p:cNvCxnSpPr/>
+          <p:cNvCxnSpPr>
+            <a:cxnSpLocks noChangeAspect="1"/>
+          </p:cNvCxnSpPr>
           <p:nvPr/>
         </p:nvCxnSpPr>
         <p:spPr>
@@ -22449,7 +23692,9 @@
               </a:ext>
             </a:extLst>
           </p:cNvPr>
-          <p:cNvCxnSpPr/>
+          <p:cNvCxnSpPr>
+            <a:cxnSpLocks noChangeAspect="1"/>
+          </p:cNvCxnSpPr>
           <p:nvPr/>
         </p:nvCxnSpPr>
         <p:spPr>
@@ -22493,7 +23738,9 @@
               </a:ext>
             </a:extLst>
           </p:cNvPr>
-          <p:cNvCxnSpPr/>
+          <p:cNvCxnSpPr>
+            <a:cxnSpLocks noChangeAspect="1"/>
+          </p:cNvCxnSpPr>
           <p:nvPr/>
         </p:nvCxnSpPr>
         <p:spPr>
@@ -22537,7 +23784,9 @@
               </a:ext>
             </a:extLst>
           </p:cNvPr>
-          <p:cNvGrpSpPr/>
+          <p:cNvGrpSpPr>
+            <a:grpSpLocks noChangeAspect="1"/>
+          </p:cNvGrpSpPr>
           <p:nvPr/>
         </p:nvGrpSpPr>
         <p:grpSpPr>
@@ -23022,7 +24271,9 @@
               </a:ext>
             </a:extLst>
           </p:cNvPr>
-          <p:cNvSpPr/>
+          <p:cNvSpPr>
+            <a:spLocks noChangeAspect="1"/>
+          </p:cNvSpPr>
           <p:nvPr/>
         </p:nvSpPr>
         <p:spPr>
@@ -23076,7 +24327,9 @@
               </a:ext>
             </a:extLst>
           </p:cNvPr>
-          <p:cNvGrpSpPr/>
+          <p:cNvGrpSpPr>
+            <a:grpSpLocks noChangeAspect="1"/>
+          </p:cNvGrpSpPr>
           <p:nvPr/>
         </p:nvGrpSpPr>
         <p:grpSpPr>
@@ -23424,7 +24677,9 @@
               </a:ext>
             </a:extLst>
           </p:cNvPr>
-          <p:cNvGrpSpPr/>
+          <p:cNvGrpSpPr>
+            <a:grpSpLocks noChangeAspect="1"/>
+          </p:cNvGrpSpPr>
           <p:nvPr/>
         </p:nvGrpSpPr>
         <p:grpSpPr>
@@ -23831,7 +25086,9 @@
               </a:ext>
             </a:extLst>
           </p:cNvPr>
-          <p:cNvGrpSpPr/>
+          <p:cNvGrpSpPr>
+            <a:grpSpLocks noChangeAspect="1"/>
+          </p:cNvGrpSpPr>
           <p:nvPr/>
         </p:nvGrpSpPr>
         <p:grpSpPr>
@@ -23941,7 +25198,9 @@
               </a:ext>
             </a:extLst>
           </p:cNvPr>
-          <p:cNvGrpSpPr/>
+          <p:cNvGrpSpPr>
+            <a:grpSpLocks noChangeAspect="1"/>
+          </p:cNvGrpSpPr>
           <p:nvPr/>
         </p:nvGrpSpPr>
         <p:grpSpPr>
@@ -24053,7 +25312,9 @@
               </a:ext>
             </a:extLst>
           </p:cNvPr>
-          <p:cNvGrpSpPr/>
+          <p:cNvGrpSpPr>
+            <a:grpSpLocks noChangeAspect="1"/>
+          </p:cNvGrpSpPr>
           <p:nvPr/>
         </p:nvGrpSpPr>
         <p:grpSpPr>
@@ -24167,7 +25428,9 @@
               </a:ext>
             </a:extLst>
           </p:cNvPr>
-          <p:cNvGrpSpPr/>
+          <p:cNvGrpSpPr>
+            <a:grpSpLocks noChangeAspect="1"/>
+          </p:cNvGrpSpPr>
           <p:nvPr/>
         </p:nvGrpSpPr>
         <p:grpSpPr>
@@ -24267,7 +25530,9 @@
               </a:ext>
             </a:extLst>
           </p:cNvPr>
-          <p:cNvGrpSpPr/>
+          <p:cNvGrpSpPr>
+            <a:grpSpLocks noChangeAspect="1"/>
+          </p:cNvGrpSpPr>
           <p:nvPr/>
         </p:nvGrpSpPr>
         <p:grpSpPr>
@@ -24671,7 +25936,9 @@
               </a:ext>
             </a:extLst>
           </p:cNvPr>
-          <p:cNvGrpSpPr/>
+          <p:cNvGrpSpPr>
+            <a:grpSpLocks noChangeAspect="1"/>
+          </p:cNvGrpSpPr>
           <p:nvPr/>
         </p:nvGrpSpPr>
         <p:grpSpPr>
@@ -24785,7 +26052,9 @@
               </a:ext>
             </a:extLst>
           </p:cNvPr>
-          <p:cNvGrpSpPr/>
+          <p:cNvGrpSpPr>
+            <a:grpSpLocks noChangeAspect="1"/>
+          </p:cNvGrpSpPr>
           <p:nvPr/>
         </p:nvGrpSpPr>
         <p:grpSpPr>
@@ -24935,7 +26204,9 @@
               </a:ext>
             </a:extLst>
           </p:cNvPr>
-          <p:cNvCxnSpPr/>
+          <p:cNvCxnSpPr>
+            <a:cxnSpLocks noChangeAspect="1"/>
+          </p:cNvCxnSpPr>
           <p:nvPr/>
         </p:nvCxnSpPr>
         <p:spPr>
@@ -25049,7 +26320,9 @@
               </a:ext>
             </a:extLst>
           </p:cNvPr>
-          <p:cNvCxnSpPr/>
+          <p:cNvCxnSpPr>
+            <a:cxnSpLocks noChangeAspect="1"/>
+          </p:cNvCxnSpPr>
           <p:nvPr/>
         </p:nvCxnSpPr>
         <p:spPr>
@@ -25128,7 +26401,9 @@
               </a:ext>
             </a:extLst>
           </p:cNvPr>
-          <p:cNvCxnSpPr/>
+          <p:cNvCxnSpPr>
+            <a:cxnSpLocks noChangeAspect="1"/>
+          </p:cNvCxnSpPr>
           <p:nvPr/>
         </p:nvCxnSpPr>
         <p:spPr>
@@ -25207,7 +26482,9 @@
               </a:ext>
             </a:extLst>
           </p:cNvPr>
-          <p:cNvCxnSpPr/>
+          <p:cNvCxnSpPr>
+            <a:cxnSpLocks noChangeAspect="1"/>
+          </p:cNvCxnSpPr>
           <p:nvPr/>
         </p:nvCxnSpPr>
         <p:spPr>
@@ -25251,7 +26528,9 @@
               </a:ext>
             </a:extLst>
           </p:cNvPr>
-          <p:cNvCxnSpPr/>
+          <p:cNvCxnSpPr>
+            <a:cxnSpLocks noChangeAspect="1"/>
+          </p:cNvCxnSpPr>
           <p:nvPr/>
         </p:nvCxnSpPr>
         <p:spPr>
@@ -25295,7 +26574,9 @@
               </a:ext>
             </a:extLst>
           </p:cNvPr>
-          <p:cNvCxnSpPr/>
+          <p:cNvCxnSpPr>
+            <a:cxnSpLocks noChangeAspect="1"/>
+          </p:cNvCxnSpPr>
           <p:nvPr/>
         </p:nvCxnSpPr>
         <p:spPr>
@@ -25479,7 +26760,9 @@
               </a:ext>
             </a:extLst>
           </p:cNvPr>
-          <p:cNvSpPr/>
+          <p:cNvSpPr>
+            <a:spLocks noChangeAspect="1"/>
+          </p:cNvSpPr>
           <p:nvPr/>
         </p:nvSpPr>
         <p:spPr>
@@ -25533,7 +26816,9 @@
               </a:ext>
             </a:extLst>
           </p:cNvPr>
-          <p:cNvSpPr/>
+          <p:cNvSpPr>
+            <a:spLocks noChangeAspect="1"/>
+          </p:cNvSpPr>
           <p:nvPr/>
         </p:nvSpPr>
         <p:spPr>
@@ -25588,7 +26873,9 @@
               </a:ext>
             </a:extLst>
           </p:cNvPr>
-          <p:cNvSpPr/>
+          <p:cNvSpPr>
+            <a:spLocks noChangeAspect="1"/>
+          </p:cNvSpPr>
           <p:nvPr/>
         </p:nvSpPr>
         <p:spPr>
@@ -25643,7 +26930,9 @@
               </a:ext>
             </a:extLst>
           </p:cNvPr>
-          <p:cNvGrpSpPr/>
+          <p:cNvGrpSpPr>
+            <a:grpSpLocks noChangeAspect="1"/>
+          </p:cNvGrpSpPr>
           <p:nvPr/>
         </p:nvGrpSpPr>
         <p:grpSpPr>
@@ -25903,7 +27192,9 @@
               </a:ext>
             </a:extLst>
           </p:cNvPr>
-          <p:cNvGrpSpPr/>
+          <p:cNvGrpSpPr>
+            <a:grpSpLocks noChangeAspect="1"/>
+          </p:cNvGrpSpPr>
           <p:nvPr/>
         </p:nvGrpSpPr>
         <p:grpSpPr>

</xml_diff>